<commit_message>
added the video link
</commit_message>
<xml_diff>
--- a/slides/Woo_GBE3037_L09.pptx
+++ b/slides/Woo_GBE3037_L09.pptx
@@ -5,23 +5,24 @@
     <p:sldMasterId id="2147483648" r:id="rId1"/>
   </p:sldMasterIdLst>
   <p:notesMasterIdLst>
-    <p:notesMasterId r:id="rId16"/>
+    <p:notesMasterId r:id="rId17"/>
   </p:notesMasterIdLst>
   <p:sldIdLst>
     <p:sldId id="256" r:id="rId2"/>
     <p:sldId id="283" r:id="rId3"/>
     <p:sldId id="284" r:id="rId4"/>
     <p:sldId id="286" r:id="rId5"/>
-    <p:sldId id="287" r:id="rId6"/>
-    <p:sldId id="260" r:id="rId7"/>
-    <p:sldId id="276" r:id="rId8"/>
-    <p:sldId id="277" r:id="rId9"/>
-    <p:sldId id="278" r:id="rId10"/>
-    <p:sldId id="279" r:id="rId11"/>
-    <p:sldId id="302" r:id="rId12"/>
-    <p:sldId id="303" r:id="rId13"/>
-    <p:sldId id="261" r:id="rId14"/>
-    <p:sldId id="281" r:id="rId15"/>
+    <p:sldId id="330" r:id="rId6"/>
+    <p:sldId id="287" r:id="rId7"/>
+    <p:sldId id="260" r:id="rId8"/>
+    <p:sldId id="276" r:id="rId9"/>
+    <p:sldId id="277" r:id="rId10"/>
+    <p:sldId id="278" r:id="rId11"/>
+    <p:sldId id="279" r:id="rId12"/>
+    <p:sldId id="302" r:id="rId13"/>
+    <p:sldId id="303" r:id="rId14"/>
+    <p:sldId id="261" r:id="rId15"/>
+    <p:sldId id="281" r:id="rId16"/>
   </p:sldIdLst>
   <p:sldSz cx="12192000" cy="6858000"/>
   <p:notesSz cx="6858000" cy="9144000"/>
@@ -210,7 +211,7 @@
           <a:p>
             <a:fld id="{65F32F1C-A509-984F-9E5B-E228248344CD}" type="datetimeFigureOut">
               <a:rPr kumimoji="1" lang="ko-KR" altLang="en-US" smtClean="0"/>
-              <a:t>2019. 3. 20.</a:t>
+              <a:t>2019. 4. 1.</a:t>
             </a:fld>
             <a:endParaRPr kumimoji="1" lang="ko-KR" altLang="en-US"/>
           </a:p>
@@ -542,7 +543,7 @@
           <a:p>
             <a:fld id="{0783281F-892B-614E-B792-481EB2F7C5B7}" type="slidenum">
               <a:rPr kumimoji="1" lang="ko-KR" altLang="en-US" smtClean="0"/>
-              <a:t>6</a:t>
+              <a:t>7</a:t>
             </a:fld>
             <a:endParaRPr kumimoji="1" lang="ko-KR" altLang="en-US"/>
           </a:p>
@@ -626,7 +627,7 @@
           <a:p>
             <a:fld id="{0783281F-892B-614E-B792-481EB2F7C5B7}" type="slidenum">
               <a:rPr kumimoji="1" lang="ko-KR" altLang="en-US" smtClean="0"/>
-              <a:t>7</a:t>
+              <a:t>8</a:t>
             </a:fld>
             <a:endParaRPr kumimoji="1" lang="ko-KR" altLang="en-US"/>
           </a:p>
@@ -710,7 +711,7 @@
           <a:p>
             <a:fld id="{0783281F-892B-614E-B792-481EB2F7C5B7}" type="slidenum">
               <a:rPr kumimoji="1" lang="ko-KR" altLang="en-US" smtClean="0"/>
-              <a:t>8</a:t>
+              <a:t>9</a:t>
             </a:fld>
             <a:endParaRPr kumimoji="1" lang="ko-KR" altLang="en-US"/>
           </a:p>
@@ -794,7 +795,7 @@
           <a:p>
             <a:fld id="{0783281F-892B-614E-B792-481EB2F7C5B7}" type="slidenum">
               <a:rPr kumimoji="1" lang="ko-KR" altLang="en-US" smtClean="0"/>
-              <a:t>9</a:t>
+              <a:t>10</a:t>
             </a:fld>
             <a:endParaRPr kumimoji="1" lang="ko-KR" altLang="en-US"/>
           </a:p>
@@ -878,7 +879,7 @@
           <a:p>
             <a:fld id="{0783281F-892B-614E-B792-481EB2F7C5B7}" type="slidenum">
               <a:rPr kumimoji="1" lang="ko-KR" altLang="en-US" smtClean="0"/>
-              <a:t>10</a:t>
+              <a:t>11</a:t>
             </a:fld>
             <a:endParaRPr kumimoji="1" lang="ko-KR" altLang="en-US"/>
           </a:p>
@@ -962,7 +963,7 @@
           <a:p>
             <a:fld id="{0783281F-892B-614E-B792-481EB2F7C5B7}" type="slidenum">
               <a:rPr kumimoji="1" lang="ko-KR" altLang="en-US" smtClean="0"/>
-              <a:t>13</a:t>
+              <a:t>14</a:t>
             </a:fld>
             <a:endParaRPr kumimoji="1" lang="ko-KR" altLang="en-US"/>
           </a:p>
@@ -1046,7 +1047,7 @@
           <a:p>
             <a:fld id="{0783281F-892B-614E-B792-481EB2F7C5B7}" type="slidenum">
               <a:rPr kumimoji="1" lang="ko-KR" altLang="en-US" smtClean="0"/>
-              <a:t>14</a:t>
+              <a:t>15</a:t>
             </a:fld>
             <a:endParaRPr kumimoji="1" lang="ko-KR" altLang="en-US"/>
           </a:p>
@@ -1194,7 +1195,7 @@
           <a:p>
             <a:fld id="{D1CBEE32-551C-D044-9ECF-F871403689A5}" type="datetimeFigureOut">
               <a:rPr kumimoji="1" lang="ko-KR" altLang="en-US" smtClean="0"/>
-              <a:t>2019. 3. 20.</a:t>
+              <a:t>2019. 4. 1.</a:t>
             </a:fld>
             <a:endParaRPr kumimoji="1" lang="ko-KR" altLang="en-US"/>
           </a:p>
@@ -1362,7 +1363,7 @@
           <a:p>
             <a:fld id="{D1CBEE32-551C-D044-9ECF-F871403689A5}" type="datetimeFigureOut">
               <a:rPr kumimoji="1" lang="ko-KR" altLang="en-US" smtClean="0"/>
-              <a:t>2019. 3. 20.</a:t>
+              <a:t>2019. 4. 1.</a:t>
             </a:fld>
             <a:endParaRPr kumimoji="1" lang="ko-KR" altLang="en-US"/>
           </a:p>
@@ -1540,7 +1541,7 @@
           <a:p>
             <a:fld id="{D1CBEE32-551C-D044-9ECF-F871403689A5}" type="datetimeFigureOut">
               <a:rPr kumimoji="1" lang="ko-KR" altLang="en-US" smtClean="0"/>
-              <a:t>2019. 3. 20.</a:t>
+              <a:t>2019. 4. 1.</a:t>
             </a:fld>
             <a:endParaRPr kumimoji="1" lang="ko-KR" altLang="en-US"/>
           </a:p>
@@ -1708,7 +1709,7 @@
           <a:p>
             <a:fld id="{D1CBEE32-551C-D044-9ECF-F871403689A5}" type="datetimeFigureOut">
               <a:rPr kumimoji="1" lang="ko-KR" altLang="en-US" smtClean="0"/>
-              <a:t>2019. 3. 20.</a:t>
+              <a:t>2019. 4. 1.</a:t>
             </a:fld>
             <a:endParaRPr kumimoji="1" lang="ko-KR" altLang="en-US"/>
           </a:p>
@@ -1953,7 +1954,7 @@
           <a:p>
             <a:fld id="{D1CBEE32-551C-D044-9ECF-F871403689A5}" type="datetimeFigureOut">
               <a:rPr kumimoji="1" lang="ko-KR" altLang="en-US" smtClean="0"/>
-              <a:t>2019. 3. 20.</a:t>
+              <a:t>2019. 4. 1.</a:t>
             </a:fld>
             <a:endParaRPr kumimoji="1" lang="ko-KR" altLang="en-US"/>
           </a:p>
@@ -2182,7 +2183,7 @@
           <a:p>
             <a:fld id="{D1CBEE32-551C-D044-9ECF-F871403689A5}" type="datetimeFigureOut">
               <a:rPr kumimoji="1" lang="ko-KR" altLang="en-US" smtClean="0"/>
-              <a:t>2019. 3. 20.</a:t>
+              <a:t>2019. 4. 1.</a:t>
             </a:fld>
             <a:endParaRPr kumimoji="1" lang="ko-KR" altLang="en-US"/>
           </a:p>
@@ -2546,7 +2547,7 @@
           <a:p>
             <a:fld id="{D1CBEE32-551C-D044-9ECF-F871403689A5}" type="datetimeFigureOut">
               <a:rPr kumimoji="1" lang="ko-KR" altLang="en-US" smtClean="0"/>
-              <a:t>2019. 3. 20.</a:t>
+              <a:t>2019. 4. 1.</a:t>
             </a:fld>
             <a:endParaRPr kumimoji="1" lang="ko-KR" altLang="en-US"/>
           </a:p>
@@ -2663,7 +2664,7 @@
           <a:p>
             <a:fld id="{D1CBEE32-551C-D044-9ECF-F871403689A5}" type="datetimeFigureOut">
               <a:rPr kumimoji="1" lang="ko-KR" altLang="en-US" smtClean="0"/>
-              <a:t>2019. 3. 20.</a:t>
+              <a:t>2019. 4. 1.</a:t>
             </a:fld>
             <a:endParaRPr kumimoji="1" lang="ko-KR" altLang="en-US"/>
           </a:p>
@@ -2758,7 +2759,7 @@
           <a:p>
             <a:fld id="{D1CBEE32-551C-D044-9ECF-F871403689A5}" type="datetimeFigureOut">
               <a:rPr kumimoji="1" lang="ko-KR" altLang="en-US" smtClean="0"/>
-              <a:t>2019. 3. 20.</a:t>
+              <a:t>2019. 4. 1.</a:t>
             </a:fld>
             <a:endParaRPr kumimoji="1" lang="ko-KR" altLang="en-US"/>
           </a:p>
@@ -3033,7 +3034,7 @@
           <a:p>
             <a:fld id="{D1CBEE32-551C-D044-9ECF-F871403689A5}" type="datetimeFigureOut">
               <a:rPr kumimoji="1" lang="ko-KR" altLang="en-US" smtClean="0"/>
-              <a:t>2019. 3. 20.</a:t>
+              <a:t>2019. 4. 1.</a:t>
             </a:fld>
             <a:endParaRPr kumimoji="1" lang="ko-KR" altLang="en-US"/>
           </a:p>
@@ -3285,7 +3286,7 @@
           <a:p>
             <a:fld id="{D1CBEE32-551C-D044-9ECF-F871403689A5}" type="datetimeFigureOut">
               <a:rPr kumimoji="1" lang="ko-KR" altLang="en-US" smtClean="0"/>
-              <a:t>2019. 3. 20.</a:t>
+              <a:t>2019. 4. 1.</a:t>
             </a:fld>
             <a:endParaRPr kumimoji="1" lang="ko-KR" altLang="en-US"/>
           </a:p>
@@ -3496,7 +3497,7 @@
           <a:p>
             <a:fld id="{D1CBEE32-551C-D044-9ECF-F871403689A5}" type="datetimeFigureOut">
               <a:rPr kumimoji="1" lang="ko-KR" altLang="en-US" smtClean="0"/>
-              <a:t>2019. 3. 20.</a:t>
+              <a:t>2019. 4. 1.</a:t>
             </a:fld>
             <a:endParaRPr kumimoji="1" lang="ko-KR" altLang="en-US"/>
           </a:p>
@@ -4468,6 +4469,1470 @@
         <p:spPr>
           <a:xfrm>
             <a:off x="216491" y="222608"/>
+            <a:ext cx="2315057" cy="523220"/>
+          </a:xfrm>
+          <a:prstGeom prst="rect">
+            <a:avLst/>
+          </a:prstGeom>
+        </p:spPr>
+        <p:txBody>
+          <a:bodyPr wrap="none">
+            <a:spAutoFit/>
+          </a:bodyPr>
+          <a:lstStyle/>
+          <a:p>
+            <a:r>
+              <a:rPr lang="en-US" altLang="ko-KR" sz="2800" dirty="0">
+                <a:latin typeface="Seravek" charset="0"/>
+                <a:ea typeface="Seravek" charset="0"/>
+                <a:cs typeface="Seravek" charset="0"/>
+              </a:rPr>
+              <a:t>Independence</a:t>
+            </a:r>
+            <a:endParaRPr lang="ko-KR" altLang="en-US" sz="2800" dirty="0">
+              <a:latin typeface="Seravek" charset="0"/>
+              <a:ea typeface="Seravek" charset="0"/>
+              <a:cs typeface="Seravek" charset="0"/>
+            </a:endParaRPr>
+          </a:p>
+        </p:txBody>
+      </p:sp>
+      <mc:AlternateContent xmlns:mc="http://schemas.openxmlformats.org/markup-compatibility/2006" xmlns:a14="http://schemas.microsoft.com/office/drawing/2010/main">
+        <mc:Choice Requires="a14">
+          <p:sp>
+            <p:nvSpPr>
+              <p:cNvPr id="14" name="텍스트 상자 13"/>
+              <p:cNvSpPr txBox="1"/>
+              <p:nvPr/>
+            </p:nvSpPr>
+            <p:spPr>
+              <a:xfrm>
+                <a:off x="1136287" y="989045"/>
+                <a:ext cx="10657608" cy="3831818"/>
+              </a:xfrm>
+              <a:prstGeom prst="rect">
+                <a:avLst/>
+              </a:prstGeom>
+              <a:noFill/>
+            </p:spPr>
+            <p:txBody>
+              <a:bodyPr wrap="square" rtlCol="0">
+                <a:spAutoFit/>
+              </a:bodyPr>
+              <a:lstStyle/>
+              <a:p>
+                <a:pPr marL="314325" indent="-314325">
+                  <a:lnSpc>
+                    <a:spcPct val="150000"/>
+                  </a:lnSpc>
+                  <a:buFont typeface="Arial" charset="0"/>
+                  <a:buChar char="•"/>
+                </a:pPr>
+                <a:r>
+                  <a:rPr lang="en-US" altLang="ko-KR" dirty="0">
+                    <a:latin typeface="Seravek Light" charset="0"/>
+                    <a:ea typeface="Seravek Light" charset="0"/>
+                    <a:cs typeface="Seravek Light" charset="0"/>
+                  </a:rPr>
+                  <a:t>Events </a:t>
+                </a:r>
+                <a:r>
+                  <a:rPr lang="en-US" altLang="ko-KR" b="1" dirty="0">
+                    <a:latin typeface="Seravek Light" charset="0"/>
+                    <a:ea typeface="Seravek Light" charset="0"/>
+                    <a:cs typeface="Seravek Light" charset="0"/>
+                  </a:rPr>
+                  <a:t>A</a:t>
+                </a:r>
+                <a:r>
+                  <a:rPr lang="en-US" altLang="ko-KR" dirty="0">
+                    <a:latin typeface="Seravek Light" charset="0"/>
+                    <a:ea typeface="Seravek Light" charset="0"/>
+                    <a:cs typeface="Seravek Light" charset="0"/>
+                  </a:rPr>
+                  <a:t> and </a:t>
+                </a:r>
+                <a:r>
+                  <a:rPr lang="en-US" altLang="ko-KR" b="1" dirty="0">
+                    <a:latin typeface="Seravek Light" charset="0"/>
+                    <a:ea typeface="Seravek Light" charset="0"/>
+                    <a:cs typeface="Seravek Light" charset="0"/>
+                  </a:rPr>
+                  <a:t>B</a:t>
+                </a:r>
+                <a:r>
+                  <a:rPr lang="en-US" altLang="ko-KR" dirty="0">
+                    <a:latin typeface="Seravek Light" charset="0"/>
+                    <a:ea typeface="Seravek Light" charset="0"/>
+                    <a:cs typeface="Seravek Light" charset="0"/>
+                  </a:rPr>
+                  <a:t> are independent if and only if:</a:t>
+                </a:r>
+              </a:p>
+              <a:p>
+                <a:pPr marL="771525" lvl="1" indent="-314325">
+                  <a:lnSpc>
+                    <a:spcPct val="150000"/>
+                  </a:lnSpc>
+                  <a:buFont typeface="Wingdings" charset="2"/>
+                  <a:buChar char="§"/>
+                </a:pPr>
+                <a14:m>
+                  <m:oMath xmlns:m="http://schemas.openxmlformats.org/officeDocument/2006/math">
+                    <m:r>
+                      <a:rPr lang="en-US" altLang="ko-KR" b="0" i="1" smtClean="0">
+                        <a:latin typeface="Cambria Math" charset="0"/>
+                        <a:ea typeface="Seravek Light" charset="0"/>
+                        <a:cs typeface="Seravek Light" charset="0"/>
+                      </a:rPr>
+                      <m:t>𝑃</m:t>
+                    </m:r>
+                    <m:d>
+                      <m:dPr>
+                        <m:ctrlPr>
+                          <a:rPr lang="en-US" altLang="ko-KR" b="0" i="1" smtClean="0">
+                            <a:latin typeface="Cambria Math" panose="02040503050406030204" pitchFamily="18" charset="0"/>
+                            <a:ea typeface="Seravek Light" charset="0"/>
+                            <a:cs typeface="Seravek Light" charset="0"/>
+                          </a:rPr>
+                        </m:ctrlPr>
+                      </m:dPr>
+                      <m:e>
+                        <m:r>
+                          <a:rPr lang="en-US" altLang="ko-KR" b="1" i="0" smtClean="0">
+                            <a:latin typeface="Cambria Math" charset="0"/>
+                            <a:ea typeface="Seravek Light" charset="0"/>
+                            <a:cs typeface="Seravek Light" charset="0"/>
+                          </a:rPr>
+                          <m:t>𝐁</m:t>
+                        </m:r>
+                      </m:e>
+                      <m:e>
+                        <m:r>
+                          <a:rPr lang="en-US" altLang="ko-KR" b="1" i="0" smtClean="0">
+                            <a:latin typeface="Cambria Math" charset="0"/>
+                            <a:ea typeface="Seravek Light" charset="0"/>
+                            <a:cs typeface="Seravek Light" charset="0"/>
+                          </a:rPr>
+                          <m:t>𝐀</m:t>
+                        </m:r>
+                      </m:e>
+                    </m:d>
+                    <m:r>
+                      <a:rPr lang="en-US" altLang="ko-KR" b="0" i="1" smtClean="0">
+                        <a:latin typeface="Cambria Math" charset="0"/>
+                        <a:ea typeface="Seravek Light" charset="0"/>
+                        <a:cs typeface="Seravek Light" charset="0"/>
+                      </a:rPr>
+                      <m:t>=</m:t>
+                    </m:r>
+                    <m:r>
+                      <a:rPr lang="en-US" altLang="ko-KR" b="0" i="1" smtClean="0">
+                        <a:latin typeface="Cambria Math" charset="0"/>
+                        <a:ea typeface="Seravek Light" charset="0"/>
+                        <a:cs typeface="Seravek Light" charset="0"/>
+                      </a:rPr>
+                      <m:t>𝑃</m:t>
+                    </m:r>
+                    <m:d>
+                      <m:dPr>
+                        <m:ctrlPr>
+                          <a:rPr lang="en-US" altLang="ko-KR" b="0" i="1" smtClean="0">
+                            <a:latin typeface="Cambria Math" panose="02040503050406030204" pitchFamily="18" charset="0"/>
+                            <a:ea typeface="Seravek Light" charset="0"/>
+                            <a:cs typeface="Seravek Light" charset="0"/>
+                          </a:rPr>
+                        </m:ctrlPr>
+                      </m:dPr>
+                      <m:e>
+                        <m:r>
+                          <a:rPr lang="en-US" altLang="ko-KR" b="1" i="0" smtClean="0">
+                            <a:latin typeface="Cambria Math" charset="0"/>
+                            <a:ea typeface="Seravek Light" charset="0"/>
+                            <a:cs typeface="Seravek Light" charset="0"/>
+                          </a:rPr>
+                          <m:t>𝐁</m:t>
+                        </m:r>
+                      </m:e>
+                    </m:d>
+                  </m:oMath>
+                </a14:m>
+                <a:endParaRPr lang="en-US" altLang="ko-KR" b="0" dirty="0">
+                  <a:latin typeface="Seravek Light" charset="0"/>
+                  <a:ea typeface="Seravek Light" charset="0"/>
+                  <a:cs typeface="Seravek Light" charset="0"/>
+                </a:endParaRPr>
+              </a:p>
+              <a:p>
+                <a:pPr marL="314325" indent="-314325">
+                  <a:lnSpc>
+                    <a:spcPct val="150000"/>
+                  </a:lnSpc>
+                  <a:buFont typeface="Arial" charset="0"/>
+                  <a:buChar char="•"/>
+                </a:pPr>
+                <a:endParaRPr lang="en-US" altLang="ko-KR" b="0" dirty="0">
+                  <a:latin typeface="Seravek Light" charset="0"/>
+                  <a:ea typeface="Seravek Light" charset="0"/>
+                  <a:cs typeface="Seravek Light" charset="0"/>
+                </a:endParaRPr>
+              </a:p>
+              <a:p>
+                <a:pPr marL="314325" indent="-314325">
+                  <a:lnSpc>
+                    <a:spcPct val="150000"/>
+                  </a:lnSpc>
+                  <a:buFont typeface="Arial" charset="0"/>
+                  <a:buChar char="•"/>
+                </a:pPr>
+                <a:r>
+                  <a:rPr lang="en-US" altLang="ko-KR" dirty="0">
+                    <a:latin typeface="Seravek Light" charset="0"/>
+                    <a:ea typeface="Seravek Light" charset="0"/>
+                    <a:cs typeface="Seravek Light" charset="0"/>
+                  </a:rPr>
+                  <a:t>Thus, if A and B are independent, </a:t>
+                </a:r>
+              </a:p>
+              <a:p>
+                <a:pPr marL="771525" lvl="1" indent="-314325">
+                  <a:lnSpc>
+                    <a:spcPct val="150000"/>
+                  </a:lnSpc>
+                  <a:buFont typeface="Wingdings" charset="2"/>
+                  <a:buChar char="§"/>
+                </a:pPr>
+                <a14:m>
+                  <m:oMath xmlns:m="http://schemas.openxmlformats.org/officeDocument/2006/math">
+                    <m:r>
+                      <a:rPr lang="en-US" altLang="ko-KR" b="0" i="1" smtClean="0">
+                        <a:solidFill>
+                          <a:schemeClr val="tx1"/>
+                        </a:solidFill>
+                        <a:latin typeface="Cambria Math" charset="0"/>
+                        <a:ea typeface="Seravek Light" charset="0"/>
+                        <a:cs typeface="Seravek Light" charset="0"/>
+                      </a:rPr>
+                      <m:t>𝑃</m:t>
+                    </m:r>
+                    <m:d>
+                      <m:dPr>
+                        <m:ctrlPr>
+                          <a:rPr lang="en-US" altLang="ko-KR" i="1">
+                            <a:solidFill>
+                              <a:schemeClr val="tx1"/>
+                            </a:solidFill>
+                            <a:latin typeface="Cambria Math" panose="02040503050406030204" pitchFamily="18" charset="0"/>
+                            <a:ea typeface="Seravek Light" charset="0"/>
+                            <a:cs typeface="Seravek Light" charset="0"/>
+                          </a:rPr>
+                        </m:ctrlPr>
+                      </m:dPr>
+                      <m:e>
+                        <m:r>
+                          <a:rPr lang="en-US" altLang="ko-KR" b="1">
+                            <a:solidFill>
+                              <a:schemeClr val="tx1"/>
+                            </a:solidFill>
+                            <a:latin typeface="Cambria Math" charset="0"/>
+                            <a:ea typeface="Seravek Light" charset="0"/>
+                            <a:cs typeface="Seravek Light" charset="0"/>
+                          </a:rPr>
+                          <m:t>𝐀</m:t>
+                        </m:r>
+                        <m:r>
+                          <a:rPr lang="en-US" altLang="ko-KR" i="1">
+                            <a:solidFill>
+                              <a:schemeClr val="tx1"/>
+                            </a:solidFill>
+                            <a:latin typeface="Cambria Math" charset="0"/>
+                            <a:ea typeface="Seravek Light" charset="0"/>
+                            <a:cs typeface="Seravek Light" charset="0"/>
+                          </a:rPr>
+                          <m:t> </m:t>
+                        </m:r>
+                        <m:r>
+                          <a:rPr lang="en-US" altLang="ko-KR" i="1">
+                            <a:solidFill>
+                              <a:schemeClr val="tx1"/>
+                            </a:solidFill>
+                            <a:latin typeface="Cambria Math" charset="0"/>
+                            <a:ea typeface="Seravek Light" charset="0"/>
+                            <a:cs typeface="Seravek Light" charset="0"/>
+                          </a:rPr>
+                          <m:t>𝑎𝑛𝑑</m:t>
+                        </m:r>
+                        <m:r>
+                          <a:rPr lang="en-US" altLang="ko-KR" i="1">
+                            <a:solidFill>
+                              <a:schemeClr val="tx1"/>
+                            </a:solidFill>
+                            <a:latin typeface="Cambria Math" charset="0"/>
+                            <a:ea typeface="Seravek Light" charset="0"/>
+                            <a:cs typeface="Seravek Light" charset="0"/>
+                          </a:rPr>
+                          <m:t> </m:t>
+                        </m:r>
+                        <m:r>
+                          <a:rPr lang="en-US" altLang="ko-KR" b="1">
+                            <a:solidFill>
+                              <a:schemeClr val="tx1"/>
+                            </a:solidFill>
+                            <a:latin typeface="Cambria Math" charset="0"/>
+                            <a:ea typeface="Seravek Light" charset="0"/>
+                            <a:cs typeface="Seravek Light" charset="0"/>
+                          </a:rPr>
+                          <m:t>𝐁</m:t>
+                        </m:r>
+                      </m:e>
+                    </m:d>
+                    <m:r>
+                      <a:rPr lang="en-US" altLang="ko-KR" i="1">
+                        <a:solidFill>
+                          <a:schemeClr val="tx1"/>
+                        </a:solidFill>
+                        <a:latin typeface="Cambria Math" charset="0"/>
+                        <a:ea typeface="Seravek Light" charset="0"/>
+                        <a:cs typeface="Seravek Light" charset="0"/>
+                      </a:rPr>
+                      <m:t>=</m:t>
+                    </m:r>
+                    <m:r>
+                      <a:rPr lang="en-US" altLang="ko-KR" b="0" i="1">
+                        <a:solidFill>
+                          <a:schemeClr val="tx1"/>
+                        </a:solidFill>
+                        <a:latin typeface="Cambria Math" charset="0"/>
+                        <a:ea typeface="Seravek Light" charset="0"/>
+                        <a:cs typeface="Seravek Light" charset="0"/>
+                      </a:rPr>
+                      <m:t>𝑃</m:t>
+                    </m:r>
+                    <m:d>
+                      <m:dPr>
+                        <m:ctrlPr>
+                          <a:rPr lang="en-US" altLang="ko-KR" i="1">
+                            <a:solidFill>
+                              <a:schemeClr val="tx1"/>
+                            </a:solidFill>
+                            <a:latin typeface="Cambria Math" panose="02040503050406030204" pitchFamily="18" charset="0"/>
+                            <a:ea typeface="Seravek Light" charset="0"/>
+                            <a:cs typeface="Seravek Light" charset="0"/>
+                          </a:rPr>
+                        </m:ctrlPr>
+                      </m:dPr>
+                      <m:e>
+                        <m:r>
+                          <a:rPr lang="en-US" altLang="ko-KR" b="1">
+                            <a:solidFill>
+                              <a:schemeClr val="tx1"/>
+                            </a:solidFill>
+                            <a:latin typeface="Cambria Math" charset="0"/>
+                            <a:ea typeface="Seravek Light" charset="0"/>
+                            <a:cs typeface="Seravek Light" charset="0"/>
+                          </a:rPr>
+                          <m:t>𝐀</m:t>
+                        </m:r>
+                      </m:e>
+                    </m:d>
+                    <m:r>
+                      <a:rPr lang="en-US" altLang="ko-KR" i="1">
+                        <a:solidFill>
+                          <a:schemeClr val="tx1"/>
+                        </a:solidFill>
+                        <a:latin typeface="Cambria Math" charset="0"/>
+                        <a:ea typeface="Seravek Light" charset="0"/>
+                        <a:cs typeface="Seravek Light" charset="0"/>
+                      </a:rPr>
+                      <m:t> </m:t>
+                    </m:r>
+                    <m:r>
+                      <a:rPr lang="en-US" altLang="ko-KR" i="1">
+                        <a:solidFill>
+                          <a:schemeClr val="tx1"/>
+                        </a:solidFill>
+                        <a:latin typeface="Cambria Math" charset="0"/>
+                        <a:ea typeface="Cambria Math" charset="0"/>
+                        <a:cs typeface="Cambria Math" charset="0"/>
+                      </a:rPr>
+                      <m:t>× </m:t>
+                    </m:r>
+                    <m:r>
+                      <a:rPr lang="en-US" altLang="ko-KR" b="0" i="1">
+                        <a:solidFill>
+                          <a:schemeClr val="tx1"/>
+                        </a:solidFill>
+                        <a:latin typeface="Cambria Math" charset="0"/>
+                        <a:ea typeface="Cambria Math" charset="0"/>
+                        <a:cs typeface="Cambria Math" charset="0"/>
+                      </a:rPr>
+                      <m:t>𝑃</m:t>
+                    </m:r>
+                    <m:d>
+                      <m:dPr>
+                        <m:ctrlPr>
+                          <a:rPr lang="en-US" altLang="ko-KR" i="1">
+                            <a:solidFill>
+                              <a:schemeClr val="tx1"/>
+                            </a:solidFill>
+                            <a:latin typeface="Cambria Math" panose="02040503050406030204" pitchFamily="18" charset="0"/>
+                            <a:ea typeface="Cambria Math" charset="0"/>
+                            <a:cs typeface="Cambria Math" charset="0"/>
+                          </a:rPr>
+                        </m:ctrlPr>
+                      </m:dPr>
+                      <m:e>
+                        <m:r>
+                          <a:rPr lang="en-US" altLang="ko-KR" b="1">
+                            <a:solidFill>
+                              <a:schemeClr val="tx1"/>
+                            </a:solidFill>
+                            <a:latin typeface="Cambria Math" charset="0"/>
+                            <a:ea typeface="Cambria Math" charset="0"/>
+                            <a:cs typeface="Cambria Math" charset="0"/>
+                          </a:rPr>
+                          <m:t>𝐁</m:t>
+                        </m:r>
+                      </m:e>
+                      <m:e>
+                        <m:r>
+                          <a:rPr lang="en-US" altLang="ko-KR" b="1">
+                            <a:solidFill>
+                              <a:schemeClr val="tx1"/>
+                            </a:solidFill>
+                            <a:latin typeface="Cambria Math" charset="0"/>
+                            <a:ea typeface="Cambria Math" charset="0"/>
+                            <a:cs typeface="Cambria Math" charset="0"/>
+                          </a:rPr>
+                          <m:t>𝐀</m:t>
+                        </m:r>
+                      </m:e>
+                    </m:d>
+                    <m:r>
+                      <a:rPr lang="en-US" altLang="ko-KR" i="1">
+                        <a:solidFill>
+                          <a:schemeClr val="tx1"/>
+                        </a:solidFill>
+                        <a:latin typeface="Cambria Math" charset="0"/>
+                        <a:ea typeface="Cambria Math" charset="0"/>
+                        <a:cs typeface="Cambria Math" charset="0"/>
+                      </a:rPr>
+                      <m:t>=</m:t>
+                    </m:r>
+                    <m:r>
+                      <a:rPr lang="en-US" altLang="ko-KR" b="0" i="1">
+                        <a:solidFill>
+                          <a:schemeClr val="tx1"/>
+                        </a:solidFill>
+                        <a:latin typeface="Cambria Math" charset="0"/>
+                        <a:ea typeface="Seravek Light" charset="0"/>
+                        <a:cs typeface="Seravek Light" charset="0"/>
+                      </a:rPr>
+                      <m:t>𝑃</m:t>
+                    </m:r>
+                    <m:d>
+                      <m:dPr>
+                        <m:ctrlPr>
+                          <a:rPr lang="en-US" altLang="ko-KR" i="1">
+                            <a:solidFill>
+                              <a:schemeClr val="tx1"/>
+                            </a:solidFill>
+                            <a:latin typeface="Cambria Math" panose="02040503050406030204" pitchFamily="18" charset="0"/>
+                            <a:ea typeface="Seravek Light" charset="0"/>
+                            <a:cs typeface="Seravek Light" charset="0"/>
+                          </a:rPr>
+                        </m:ctrlPr>
+                      </m:dPr>
+                      <m:e>
+                        <m:r>
+                          <a:rPr lang="en-US" altLang="ko-KR" b="1">
+                            <a:solidFill>
+                              <a:schemeClr val="tx1"/>
+                            </a:solidFill>
+                            <a:latin typeface="Cambria Math" charset="0"/>
+                            <a:ea typeface="Seravek Light" charset="0"/>
+                            <a:cs typeface="Seravek Light" charset="0"/>
+                          </a:rPr>
+                          <m:t>𝐀</m:t>
+                        </m:r>
+                      </m:e>
+                    </m:d>
+                    <m:r>
+                      <a:rPr lang="en-US" altLang="ko-KR" i="1">
+                        <a:solidFill>
+                          <a:schemeClr val="tx1"/>
+                        </a:solidFill>
+                        <a:latin typeface="Cambria Math" charset="0"/>
+                        <a:ea typeface="Seravek Light" charset="0"/>
+                        <a:cs typeface="Seravek Light" charset="0"/>
+                      </a:rPr>
+                      <m:t> </m:t>
+                    </m:r>
+                    <m:r>
+                      <a:rPr lang="en-US" altLang="ko-KR" i="1">
+                        <a:solidFill>
+                          <a:schemeClr val="tx1"/>
+                        </a:solidFill>
+                        <a:latin typeface="Cambria Math" charset="0"/>
+                        <a:ea typeface="Cambria Math" charset="0"/>
+                        <a:cs typeface="Cambria Math" charset="0"/>
+                      </a:rPr>
+                      <m:t>× </m:t>
+                    </m:r>
+                    <m:r>
+                      <a:rPr lang="en-US" altLang="ko-KR" b="0" i="1">
+                        <a:solidFill>
+                          <a:schemeClr val="tx1"/>
+                        </a:solidFill>
+                        <a:latin typeface="Cambria Math" charset="0"/>
+                        <a:ea typeface="Cambria Math" charset="0"/>
+                        <a:cs typeface="Cambria Math" charset="0"/>
+                      </a:rPr>
+                      <m:t>𝑃</m:t>
+                    </m:r>
+                    <m:r>
+                      <a:rPr lang="en-US" altLang="ko-KR" b="1" i="1" smtClean="0">
+                        <a:solidFill>
+                          <a:schemeClr val="tx1"/>
+                        </a:solidFill>
+                        <a:latin typeface="Cambria Math" charset="0"/>
+                        <a:ea typeface="Cambria Math" charset="0"/>
+                        <a:cs typeface="Cambria Math" charset="0"/>
+                      </a:rPr>
+                      <m:t>(</m:t>
+                    </m:r>
+                    <m:r>
+                      <a:rPr lang="en-US" altLang="ko-KR" b="1" i="0" smtClean="0">
+                        <a:solidFill>
+                          <a:schemeClr val="tx1"/>
+                        </a:solidFill>
+                        <a:latin typeface="Cambria Math" charset="0"/>
+                        <a:ea typeface="Cambria Math" charset="0"/>
+                        <a:cs typeface="Cambria Math" charset="0"/>
+                      </a:rPr>
+                      <m:t>𝐁</m:t>
+                    </m:r>
+                    <m:r>
+                      <a:rPr lang="en-US" altLang="ko-KR" b="1" i="1" smtClean="0">
+                        <a:solidFill>
+                          <a:schemeClr val="tx1"/>
+                        </a:solidFill>
+                        <a:latin typeface="Cambria Math" charset="0"/>
+                        <a:ea typeface="Cambria Math" charset="0"/>
+                        <a:cs typeface="Cambria Math" charset="0"/>
+                      </a:rPr>
+                      <m:t>)</m:t>
+                    </m:r>
+                  </m:oMath>
+                </a14:m>
+                <a:endParaRPr lang="en-US" altLang="ko-KR" dirty="0">
+                  <a:solidFill>
+                    <a:schemeClr val="tx1"/>
+                  </a:solidFill>
+                  <a:latin typeface="Seravek Light" charset="0"/>
+                  <a:ea typeface="Seravek Light" charset="0"/>
+                  <a:cs typeface="Seravek Light" charset="0"/>
+                </a:endParaRPr>
+              </a:p>
+              <a:p>
+                <a:pPr marL="314325" indent="-314325">
+                  <a:lnSpc>
+                    <a:spcPct val="150000"/>
+                  </a:lnSpc>
+                  <a:buFont typeface="Arial" charset="0"/>
+                  <a:buChar char="•"/>
+                </a:pPr>
+                <a:endParaRPr lang="en-US" altLang="ko-KR" b="0" dirty="0">
+                  <a:latin typeface="Seravek Light" charset="0"/>
+                  <a:ea typeface="Seravek Light" charset="0"/>
+                  <a:cs typeface="Seravek Light" charset="0"/>
+                </a:endParaRPr>
+              </a:p>
+              <a:p>
+                <a:pPr marL="314325" indent="-314325">
+                  <a:lnSpc>
+                    <a:spcPct val="150000"/>
+                  </a:lnSpc>
+                  <a:buFont typeface="Arial" charset="0"/>
+                  <a:buChar char="•"/>
+                </a:pPr>
+                <a:r>
+                  <a:rPr lang="en-US" altLang="ko-KR" dirty="0">
+                    <a:latin typeface="Seravek Light" charset="0"/>
+                    <a:ea typeface="Seravek Light" charset="0"/>
+                    <a:cs typeface="Seravek Light" charset="0"/>
+                  </a:rPr>
+                  <a:t>Independence </a:t>
+                </a:r>
+                <a14:m>
+                  <m:oMath xmlns:m="http://schemas.openxmlformats.org/officeDocument/2006/math">
+                    <m:r>
+                      <a:rPr lang="en-US" altLang="ko-KR" i="1" smtClean="0">
+                        <a:latin typeface="Cambria Math" charset="0"/>
+                        <a:ea typeface="Cambria Math" charset="0"/>
+                        <a:cs typeface="Cambria Math" charset="0"/>
+                      </a:rPr>
+                      <m:t>≠</m:t>
+                    </m:r>
+                  </m:oMath>
+                </a14:m>
+                <a:r>
+                  <a:rPr lang="en-US" altLang="ko-KR" b="0" dirty="0">
+                    <a:latin typeface="Seravek Light" charset="0"/>
+                    <a:ea typeface="Seravek Light" charset="0"/>
+                    <a:cs typeface="Seravek Light" charset="0"/>
+                  </a:rPr>
+                  <a:t> Disjoint </a:t>
+                </a:r>
+              </a:p>
+              <a:p>
+                <a:pPr marL="771525" lvl="1" indent="-314325">
+                  <a:lnSpc>
+                    <a:spcPct val="150000"/>
+                  </a:lnSpc>
+                  <a:buFont typeface="Arial" charset="0"/>
+                  <a:buChar char="•"/>
+                </a:pPr>
+                <a:r>
+                  <a:rPr lang="en-US" altLang="ko-KR" b="1" dirty="0">
+                    <a:latin typeface="Seravek Light" charset="0"/>
+                    <a:ea typeface="Seravek Light" charset="0"/>
+                    <a:cs typeface="Seravek Light" charset="0"/>
+                  </a:rPr>
+                  <a:t>Disjoint:</a:t>
+                </a:r>
+                <a:r>
+                  <a:rPr lang="en-US" altLang="ko-KR" dirty="0">
+                    <a:latin typeface="Seravek Light" charset="0"/>
+                    <a:ea typeface="Seravek Light" charset="0"/>
+                    <a:cs typeface="Seravek Light" charset="0"/>
+                  </a:rPr>
+                  <a:t> </a:t>
+                </a:r>
+                <a:r>
+                  <a:rPr lang="en-US" altLang="ko-KR" b="1" i="1" dirty="0">
+                    <a:latin typeface="Seravek Light" charset="0"/>
+                    <a:ea typeface="Seravek Light" charset="0"/>
+                    <a:cs typeface="Seravek Light" charset="0"/>
+                  </a:rPr>
+                  <a:t>P</a:t>
+                </a:r>
+                <a:r>
+                  <a:rPr lang="en-US" altLang="ko-KR" dirty="0">
+                    <a:latin typeface="Seravek Light" charset="0"/>
+                    <a:ea typeface="Seravek Light" charset="0"/>
+                    <a:cs typeface="Seravek Light" charset="0"/>
+                  </a:rPr>
+                  <a:t>(</a:t>
+                </a:r>
+                <a:r>
+                  <a:rPr lang="en-US" altLang="ko-KR" b="1" dirty="0">
+                    <a:latin typeface="Seravek Light" charset="0"/>
+                    <a:ea typeface="Seravek Light" charset="0"/>
+                    <a:cs typeface="Seravek Light" charset="0"/>
+                  </a:rPr>
+                  <a:t>A</a:t>
+                </a:r>
+                <a:r>
+                  <a:rPr lang="en-US" altLang="ko-KR" dirty="0">
+                    <a:latin typeface="Seravek Light" charset="0"/>
+                    <a:ea typeface="Seravek Light" charset="0"/>
+                    <a:cs typeface="Seravek Light" charset="0"/>
+                  </a:rPr>
+                  <a:t> </a:t>
+                </a:r>
+                <a:r>
+                  <a:rPr lang="en-US" altLang="ko-KR" i="1" dirty="0">
+                    <a:latin typeface="Seravek Light" charset="0"/>
+                    <a:ea typeface="Seravek Light" charset="0"/>
+                    <a:cs typeface="Seravek Light" charset="0"/>
+                  </a:rPr>
+                  <a:t>and </a:t>
+                </a:r>
+                <a:r>
+                  <a:rPr lang="en-US" altLang="ko-KR" b="1" dirty="0">
+                    <a:latin typeface="Seravek Light" charset="0"/>
+                    <a:ea typeface="Seravek Light" charset="0"/>
+                    <a:cs typeface="Seravek Light" charset="0"/>
+                  </a:rPr>
+                  <a:t>B</a:t>
+                </a:r>
+                <a:r>
+                  <a:rPr lang="en-US" altLang="ko-KR" dirty="0">
+                    <a:latin typeface="Seravek Light" charset="0"/>
+                    <a:ea typeface="Seravek Light" charset="0"/>
+                    <a:cs typeface="Seravek Light" charset="0"/>
+                  </a:rPr>
+                  <a:t>) = 0: the events cannot happen simultaneously</a:t>
+                </a:r>
+              </a:p>
+              <a:p>
+                <a:pPr marL="771525" lvl="1" indent="-314325">
+                  <a:lnSpc>
+                    <a:spcPct val="150000"/>
+                  </a:lnSpc>
+                  <a:buFont typeface="Arial" charset="0"/>
+                  <a:buChar char="•"/>
+                </a:pPr>
+                <a:r>
+                  <a:rPr lang="en-US" altLang="ko-KR" b="1" dirty="0">
+                    <a:latin typeface="Seravek Light" charset="0"/>
+                    <a:ea typeface="Seravek Light" charset="0"/>
+                    <a:cs typeface="Seravek Light" charset="0"/>
+                  </a:rPr>
+                  <a:t>Independence:</a:t>
+                </a:r>
+                <a:r>
+                  <a:rPr lang="en-US" altLang="ko-KR" dirty="0">
+                    <a:latin typeface="Seravek Light" charset="0"/>
+                    <a:ea typeface="Seravek Light" charset="0"/>
+                    <a:cs typeface="Seravek Light" charset="0"/>
+                  </a:rPr>
+                  <a:t> the occurrence of A does not change the probability of B, </a:t>
+                </a:r>
+                <a14:m>
+                  <m:oMath xmlns:m="http://schemas.openxmlformats.org/officeDocument/2006/math">
+                    <m:r>
+                      <a:rPr lang="en-US" altLang="ko-KR" b="0" i="1">
+                        <a:latin typeface="Cambria Math" charset="0"/>
+                        <a:ea typeface="Seravek Light" charset="0"/>
+                        <a:cs typeface="Seravek Light" charset="0"/>
+                      </a:rPr>
+                      <m:t>𝑃</m:t>
+                    </m:r>
+                    <m:d>
+                      <m:dPr>
+                        <m:ctrlPr>
+                          <a:rPr lang="en-US" altLang="ko-KR" i="1">
+                            <a:latin typeface="Cambria Math" panose="02040503050406030204" pitchFamily="18" charset="0"/>
+                            <a:ea typeface="Seravek Light" charset="0"/>
+                            <a:cs typeface="Seravek Light" charset="0"/>
+                          </a:rPr>
+                        </m:ctrlPr>
+                      </m:dPr>
+                      <m:e>
+                        <m:r>
+                          <a:rPr lang="en-US" altLang="ko-KR" b="1">
+                            <a:latin typeface="Cambria Math" charset="0"/>
+                            <a:ea typeface="Seravek Light" charset="0"/>
+                            <a:cs typeface="Seravek Light" charset="0"/>
+                          </a:rPr>
+                          <m:t>𝐁</m:t>
+                        </m:r>
+                      </m:e>
+                      <m:e>
+                        <m:r>
+                          <a:rPr lang="en-US" altLang="ko-KR" b="1">
+                            <a:latin typeface="Cambria Math" charset="0"/>
+                            <a:ea typeface="Seravek Light" charset="0"/>
+                            <a:cs typeface="Seravek Light" charset="0"/>
+                          </a:rPr>
+                          <m:t>𝐀</m:t>
+                        </m:r>
+                      </m:e>
+                    </m:d>
+                    <m:r>
+                      <a:rPr lang="en-US" altLang="ko-KR" i="1">
+                        <a:latin typeface="Cambria Math" charset="0"/>
+                        <a:ea typeface="Seravek Light" charset="0"/>
+                        <a:cs typeface="Seravek Light" charset="0"/>
+                      </a:rPr>
+                      <m:t>=</m:t>
+                    </m:r>
+                    <m:r>
+                      <a:rPr lang="en-US" altLang="ko-KR" b="0" i="1">
+                        <a:latin typeface="Cambria Math" charset="0"/>
+                        <a:ea typeface="Seravek Light" charset="0"/>
+                        <a:cs typeface="Seravek Light" charset="0"/>
+                      </a:rPr>
+                      <m:t>𝑃</m:t>
+                    </m:r>
+                    <m:d>
+                      <m:dPr>
+                        <m:ctrlPr>
+                          <a:rPr lang="en-US" altLang="ko-KR" i="1">
+                            <a:latin typeface="Cambria Math" panose="02040503050406030204" pitchFamily="18" charset="0"/>
+                            <a:ea typeface="Seravek Light" charset="0"/>
+                            <a:cs typeface="Seravek Light" charset="0"/>
+                          </a:rPr>
+                        </m:ctrlPr>
+                      </m:dPr>
+                      <m:e>
+                        <m:r>
+                          <a:rPr lang="en-US" altLang="ko-KR" b="1">
+                            <a:latin typeface="Cambria Math" charset="0"/>
+                            <a:ea typeface="Seravek Light" charset="0"/>
+                            <a:cs typeface="Seravek Light" charset="0"/>
+                          </a:rPr>
+                          <m:t>𝐁</m:t>
+                        </m:r>
+                      </m:e>
+                    </m:d>
+                  </m:oMath>
+                </a14:m>
+                <a:endParaRPr lang="en-US" altLang="ko-KR" dirty="0">
+                  <a:latin typeface="Seravek Light" charset="0"/>
+                  <a:ea typeface="Seravek Light" charset="0"/>
+                  <a:cs typeface="Seravek Light" charset="0"/>
+                </a:endParaRPr>
+              </a:p>
+            </p:txBody>
+          </p:sp>
+        </mc:Choice>
+        <mc:Fallback xmlns="">
+          <p:sp>
+            <p:nvSpPr>
+              <p:cNvPr id="14" name="텍스트 상자 13"/>
+              <p:cNvSpPr txBox="1">
+                <a:spLocks noRot="1" noChangeAspect="1" noMove="1" noResize="1" noEditPoints="1" noAdjustHandles="1" noChangeArrowheads="1" noChangeShapeType="1" noTextEdit="1"/>
+              </p:cNvSpPr>
+              <p:nvPr/>
+            </p:nvSpPr>
+            <p:spPr>
+              <a:xfrm>
+                <a:off x="1136287" y="989045"/>
+                <a:ext cx="10657608" cy="3831818"/>
+              </a:xfrm>
+              <a:prstGeom prst="rect">
+                <a:avLst/>
+              </a:prstGeom>
+              <a:blipFill rotWithShape="0">
+                <a:blip r:embed="rId7"/>
+                <a:stretch>
+                  <a:fillRect l="-343" b="-636"/>
+                </a:stretch>
+              </a:blipFill>
+            </p:spPr>
+            <p:txBody>
+              <a:bodyPr/>
+              <a:lstStyle/>
+              <a:p>
+                <a:r>
+                  <a:rPr lang="ko-KR" altLang="en-US">
+                    <a:noFill/>
+                  </a:rPr>
+                  <a:t> </a:t>
+                </a:r>
+              </a:p>
+            </p:txBody>
+          </p:sp>
+        </mc:Fallback>
+      </mc:AlternateContent>
+      <p:sp>
+        <p:nvSpPr>
+          <p:cNvPr id="12" name="직사각형 11"/>
+          <p:cNvSpPr/>
+          <p:nvPr/>
+        </p:nvSpPr>
+        <p:spPr>
+          <a:xfrm>
+            <a:off x="9894433" y="84109"/>
+            <a:ext cx="2301508" cy="276999"/>
+          </a:xfrm>
+          <a:prstGeom prst="rect">
+            <a:avLst/>
+          </a:prstGeom>
+        </p:spPr>
+        <p:txBody>
+          <a:bodyPr wrap="square">
+            <a:spAutoFit/>
+          </a:bodyPr>
+          <a:lstStyle/>
+          <a:p>
+            <a:pPr algn="r"/>
+            <a:r>
+              <a:rPr lang="en-US" altLang="ko-KR" sz="1200" dirty="0">
+                <a:latin typeface="Seravek Light" charset="0"/>
+                <a:ea typeface="Seravek Light" charset="0"/>
+                <a:cs typeface="Seravek Light" charset="0"/>
+              </a:rPr>
+              <a:t>Lecture 10</a:t>
+            </a:r>
+            <a:endParaRPr lang="ko-KR" altLang="en-US" sz="1200" dirty="0">
+              <a:latin typeface="Seravek Light" charset="0"/>
+              <a:ea typeface="Seravek Light" charset="0"/>
+              <a:cs typeface="Seravek Light" charset="0"/>
+            </a:endParaRPr>
+          </a:p>
+        </p:txBody>
+      </p:sp>
+    </p:spTree>
+    <p:extLst>
+      <p:ext uri="{BB962C8B-B14F-4D97-AF65-F5344CB8AC3E}">
+        <p14:creationId xmlns:p14="http://schemas.microsoft.com/office/powerpoint/2010/main" val="3680418358"/>
+      </p:ext>
+    </p:extLst>
+  </p:cSld>
+  <p:clrMapOvr>
+    <a:masterClrMapping/>
+  </p:clrMapOvr>
+  <p:timing>
+    <p:tnLst>
+      <p:par>
+        <p:cTn id="1" dur="indefinite" restart="never" nodeType="tmRoot">
+          <p:childTnLst>
+            <p:seq concurrent="1" nextAc="seek">
+              <p:cTn id="2" dur="indefinite" nodeType="mainSeq">
+                <p:childTnLst>
+                  <p:par>
+                    <p:cTn id="3" fill="hold">
+                      <p:stCondLst>
+                        <p:cond delay="indefinite"/>
+                      </p:stCondLst>
+                      <p:childTnLst>
+                        <p:par>
+                          <p:cTn id="4" fill="hold">
+                            <p:stCondLst>
+                              <p:cond delay="0"/>
+                            </p:stCondLst>
+                            <p:childTnLst>
+                              <p:par>
+                                <p:cTn id="5" presetID="1" presetClass="entr" presetSubtype="0" fill="hold" grpId="0" nodeType="clickEffect">
+                                  <p:stCondLst>
+                                    <p:cond delay="0"/>
+                                  </p:stCondLst>
+                                  <p:childTnLst>
+                                    <p:set>
+                                      <p:cBhvr>
+                                        <p:cTn id="6" dur="1" fill="hold">
+                                          <p:stCondLst>
+                                            <p:cond delay="0"/>
+                                          </p:stCondLst>
+                                        </p:cTn>
+                                        <p:tgtEl>
+                                          <p:spTgt spid="14">
+                                            <p:txEl>
+                                              <p:pRg st="0" end="0"/>
+                                            </p:txEl>
+                                          </p:spTgt>
+                                        </p:tgtEl>
+                                        <p:attrNameLst>
+                                          <p:attrName>style.visibility</p:attrName>
+                                        </p:attrNameLst>
+                                      </p:cBhvr>
+                                      <p:to>
+                                        <p:strVal val="visible"/>
+                                      </p:to>
+                                    </p:set>
+                                  </p:childTnLst>
+                                </p:cTn>
+                              </p:par>
+                              <p:par>
+                                <p:cTn id="7" presetID="1" presetClass="entr" presetSubtype="0" fill="hold" grpId="0" nodeType="withEffect">
+                                  <p:stCondLst>
+                                    <p:cond delay="0"/>
+                                  </p:stCondLst>
+                                  <p:childTnLst>
+                                    <p:set>
+                                      <p:cBhvr>
+                                        <p:cTn id="8" dur="1" fill="hold">
+                                          <p:stCondLst>
+                                            <p:cond delay="0"/>
+                                          </p:stCondLst>
+                                        </p:cTn>
+                                        <p:tgtEl>
+                                          <p:spTgt spid="14">
+                                            <p:txEl>
+                                              <p:pRg st="1" end="1"/>
+                                            </p:txEl>
+                                          </p:spTgt>
+                                        </p:tgtEl>
+                                        <p:attrNameLst>
+                                          <p:attrName>style.visibility</p:attrName>
+                                        </p:attrNameLst>
+                                      </p:cBhvr>
+                                      <p:to>
+                                        <p:strVal val="visible"/>
+                                      </p:to>
+                                    </p:set>
+                                  </p:childTnLst>
+                                </p:cTn>
+                              </p:par>
+                            </p:childTnLst>
+                          </p:cTn>
+                        </p:par>
+                      </p:childTnLst>
+                    </p:cTn>
+                  </p:par>
+                  <p:par>
+                    <p:cTn id="9" fill="hold">
+                      <p:stCondLst>
+                        <p:cond delay="indefinite"/>
+                      </p:stCondLst>
+                      <p:childTnLst>
+                        <p:par>
+                          <p:cTn id="10" fill="hold">
+                            <p:stCondLst>
+                              <p:cond delay="0"/>
+                            </p:stCondLst>
+                            <p:childTnLst>
+                              <p:par>
+                                <p:cTn id="11" presetID="1" presetClass="entr" presetSubtype="0" fill="hold" grpId="0" nodeType="clickEffect">
+                                  <p:stCondLst>
+                                    <p:cond delay="0"/>
+                                  </p:stCondLst>
+                                  <p:childTnLst>
+                                    <p:set>
+                                      <p:cBhvr>
+                                        <p:cTn id="12" dur="1" fill="hold">
+                                          <p:stCondLst>
+                                            <p:cond delay="0"/>
+                                          </p:stCondLst>
+                                        </p:cTn>
+                                        <p:tgtEl>
+                                          <p:spTgt spid="14">
+                                            <p:txEl>
+                                              <p:pRg st="3" end="3"/>
+                                            </p:txEl>
+                                          </p:spTgt>
+                                        </p:tgtEl>
+                                        <p:attrNameLst>
+                                          <p:attrName>style.visibility</p:attrName>
+                                        </p:attrNameLst>
+                                      </p:cBhvr>
+                                      <p:to>
+                                        <p:strVal val="visible"/>
+                                      </p:to>
+                                    </p:set>
+                                  </p:childTnLst>
+                                </p:cTn>
+                              </p:par>
+                              <p:par>
+                                <p:cTn id="13" presetID="1" presetClass="entr" presetSubtype="0" fill="hold" grpId="0" nodeType="withEffect">
+                                  <p:stCondLst>
+                                    <p:cond delay="0"/>
+                                  </p:stCondLst>
+                                  <p:childTnLst>
+                                    <p:set>
+                                      <p:cBhvr>
+                                        <p:cTn id="14" dur="1" fill="hold">
+                                          <p:stCondLst>
+                                            <p:cond delay="0"/>
+                                          </p:stCondLst>
+                                        </p:cTn>
+                                        <p:tgtEl>
+                                          <p:spTgt spid="14">
+                                            <p:txEl>
+                                              <p:pRg st="4" end="4"/>
+                                            </p:txEl>
+                                          </p:spTgt>
+                                        </p:tgtEl>
+                                        <p:attrNameLst>
+                                          <p:attrName>style.visibility</p:attrName>
+                                        </p:attrNameLst>
+                                      </p:cBhvr>
+                                      <p:to>
+                                        <p:strVal val="visible"/>
+                                      </p:to>
+                                    </p:set>
+                                  </p:childTnLst>
+                                </p:cTn>
+                              </p:par>
+                            </p:childTnLst>
+                          </p:cTn>
+                        </p:par>
+                      </p:childTnLst>
+                    </p:cTn>
+                  </p:par>
+                  <p:par>
+                    <p:cTn id="15" fill="hold">
+                      <p:stCondLst>
+                        <p:cond delay="indefinite"/>
+                      </p:stCondLst>
+                      <p:childTnLst>
+                        <p:par>
+                          <p:cTn id="16" fill="hold">
+                            <p:stCondLst>
+                              <p:cond delay="0"/>
+                            </p:stCondLst>
+                            <p:childTnLst>
+                              <p:par>
+                                <p:cTn id="17" presetID="1" presetClass="entr" presetSubtype="0" fill="hold" grpId="0" nodeType="clickEffect">
+                                  <p:stCondLst>
+                                    <p:cond delay="0"/>
+                                  </p:stCondLst>
+                                  <p:childTnLst>
+                                    <p:set>
+                                      <p:cBhvr>
+                                        <p:cTn id="18" dur="1" fill="hold">
+                                          <p:stCondLst>
+                                            <p:cond delay="0"/>
+                                          </p:stCondLst>
+                                        </p:cTn>
+                                        <p:tgtEl>
+                                          <p:spTgt spid="14">
+                                            <p:txEl>
+                                              <p:pRg st="6" end="6"/>
+                                            </p:txEl>
+                                          </p:spTgt>
+                                        </p:tgtEl>
+                                        <p:attrNameLst>
+                                          <p:attrName>style.visibility</p:attrName>
+                                        </p:attrNameLst>
+                                      </p:cBhvr>
+                                      <p:to>
+                                        <p:strVal val="visible"/>
+                                      </p:to>
+                                    </p:set>
+                                  </p:childTnLst>
+                                </p:cTn>
+                              </p:par>
+                            </p:childTnLst>
+                          </p:cTn>
+                        </p:par>
+                      </p:childTnLst>
+                    </p:cTn>
+                  </p:par>
+                  <p:par>
+                    <p:cTn id="19" fill="hold">
+                      <p:stCondLst>
+                        <p:cond delay="indefinite"/>
+                      </p:stCondLst>
+                      <p:childTnLst>
+                        <p:par>
+                          <p:cTn id="20" fill="hold">
+                            <p:stCondLst>
+                              <p:cond delay="0"/>
+                            </p:stCondLst>
+                            <p:childTnLst>
+                              <p:par>
+                                <p:cTn id="21" presetID="1" presetClass="entr" presetSubtype="0" fill="hold" grpId="0" nodeType="clickEffect">
+                                  <p:stCondLst>
+                                    <p:cond delay="0"/>
+                                  </p:stCondLst>
+                                  <p:childTnLst>
+                                    <p:set>
+                                      <p:cBhvr>
+                                        <p:cTn id="22" dur="1" fill="hold">
+                                          <p:stCondLst>
+                                            <p:cond delay="0"/>
+                                          </p:stCondLst>
+                                        </p:cTn>
+                                        <p:tgtEl>
+                                          <p:spTgt spid="14">
+                                            <p:txEl>
+                                              <p:pRg st="7" end="7"/>
+                                            </p:txEl>
+                                          </p:spTgt>
+                                        </p:tgtEl>
+                                        <p:attrNameLst>
+                                          <p:attrName>style.visibility</p:attrName>
+                                        </p:attrNameLst>
+                                      </p:cBhvr>
+                                      <p:to>
+                                        <p:strVal val="visible"/>
+                                      </p:to>
+                                    </p:set>
+                                  </p:childTnLst>
+                                </p:cTn>
+                              </p:par>
+                            </p:childTnLst>
+                          </p:cTn>
+                        </p:par>
+                      </p:childTnLst>
+                    </p:cTn>
+                  </p:par>
+                  <p:par>
+                    <p:cTn id="23" fill="hold">
+                      <p:stCondLst>
+                        <p:cond delay="indefinite"/>
+                      </p:stCondLst>
+                      <p:childTnLst>
+                        <p:par>
+                          <p:cTn id="24" fill="hold">
+                            <p:stCondLst>
+                              <p:cond delay="0"/>
+                            </p:stCondLst>
+                            <p:childTnLst>
+                              <p:par>
+                                <p:cTn id="25" presetID="1" presetClass="entr" presetSubtype="0" fill="hold" grpId="0" nodeType="clickEffect">
+                                  <p:stCondLst>
+                                    <p:cond delay="0"/>
+                                  </p:stCondLst>
+                                  <p:childTnLst>
+                                    <p:set>
+                                      <p:cBhvr>
+                                        <p:cTn id="26" dur="1" fill="hold">
+                                          <p:stCondLst>
+                                            <p:cond delay="0"/>
+                                          </p:stCondLst>
+                                        </p:cTn>
+                                        <p:tgtEl>
+                                          <p:spTgt spid="14">
+                                            <p:txEl>
+                                              <p:pRg st="8" end="8"/>
+                                            </p:txEl>
+                                          </p:spTgt>
+                                        </p:tgtEl>
+                                        <p:attrNameLst>
+                                          <p:attrName>style.visibility</p:attrName>
+                                        </p:attrNameLst>
+                                      </p:cBhvr>
+                                      <p:to>
+                                        <p:strVal val="visible"/>
+                                      </p:to>
+                                    </p:set>
+                                  </p:childTnLst>
+                                </p:cTn>
+                              </p:par>
+                            </p:childTnLst>
+                          </p:cTn>
+                        </p:par>
+                      </p:childTnLst>
+                    </p:cTn>
+                  </p:par>
+                </p:childTnLst>
+              </p:cTn>
+              <p:prevCondLst>
+                <p:cond evt="onPrev" delay="0">
+                  <p:tgtEl>
+                    <p:sldTgt/>
+                  </p:tgtEl>
+                </p:cond>
+              </p:prevCondLst>
+              <p:nextCondLst>
+                <p:cond evt="onNext" delay="0">
+                  <p:tgtEl>
+                    <p:sldTgt/>
+                  </p:tgtEl>
+                </p:cond>
+              </p:nextCondLst>
+            </p:seq>
+          </p:childTnLst>
+        </p:cTn>
+      </p:par>
+    </p:tnLst>
+    <p:bldLst>
+      <p:bldP spid="14" grpId="0" uiExpand="1" build="p"/>
+    </p:bldLst>
+  </p:timing>
+</p:sld>
+</file>
+
+<file path=ppt/slides/slide11.xml><?xml version="1.0" encoding="utf-8"?>
+<p:sld xmlns:a="http://schemas.openxmlformats.org/drawingml/2006/main" xmlns:r="http://schemas.openxmlformats.org/officeDocument/2006/relationships" xmlns:p="http://schemas.openxmlformats.org/presentationml/2006/main">
+  <p:cSld>
+    <p:spTree>
+      <p:nvGrpSpPr>
+        <p:cNvPr id="1" name=""/>
+        <p:cNvGrpSpPr/>
+        <p:nvPr/>
+      </p:nvGrpSpPr>
+      <p:grpSpPr>
+        <a:xfrm>
+          <a:off x="0" y="0"/>
+          <a:ext cx="0" cy="0"/>
+          <a:chOff x="0" y="0"/>
+          <a:chExt cx="0" cy="0"/>
+        </a:xfrm>
+      </p:grpSpPr>
+      <p:grpSp>
+        <p:nvGrpSpPr>
+          <p:cNvPr id="8" name="그룹 7"/>
+          <p:cNvGrpSpPr/>
+          <p:nvPr/>
+        </p:nvGrpSpPr>
+        <p:grpSpPr>
+          <a:xfrm>
+            <a:off x="10422294" y="6186196"/>
+            <a:ext cx="1661681" cy="671804"/>
+            <a:chOff x="18662" y="6209254"/>
+            <a:chExt cx="1661681" cy="671804"/>
+          </a:xfrm>
+        </p:grpSpPr>
+        <p:pic>
+          <p:nvPicPr>
+            <p:cNvPr id="5" name="그림 4"/>
+            <p:cNvPicPr>
+              <a:picLocks noChangeAspect="1"/>
+            </p:cNvPicPr>
+            <p:nvPr/>
+          </p:nvPicPr>
+          <p:blipFill>
+            <a:blip r:embed="rId3">
+              <a:extLst>
+                <a:ext uri="{28A0092B-C50C-407E-A947-70E740481C1C}">
+                  <a14:useLocalDpi xmlns:a14="http://schemas.microsoft.com/office/drawing/2010/main" val="0"/>
+                </a:ext>
+              </a:extLst>
+            </a:blip>
+            <a:stretch>
+              <a:fillRect/>
+            </a:stretch>
+          </p:blipFill>
+          <p:spPr>
+            <a:xfrm>
+              <a:off x="18662" y="6209254"/>
+              <a:ext cx="671804" cy="671804"/>
+            </a:xfrm>
+            <a:prstGeom prst="rect">
+              <a:avLst/>
+            </a:prstGeom>
+          </p:spPr>
+        </p:pic>
+        <p:pic>
+          <p:nvPicPr>
+            <p:cNvPr id="6" name="그림 5"/>
+            <p:cNvPicPr>
+              <a:picLocks noChangeAspect="1"/>
+            </p:cNvPicPr>
+            <p:nvPr/>
+          </p:nvPicPr>
+          <p:blipFill>
+            <a:blip r:embed="rId4"/>
+            <a:stretch>
+              <a:fillRect/>
+            </a:stretch>
+          </p:blipFill>
+          <p:spPr>
+            <a:xfrm>
+              <a:off x="625149" y="6262887"/>
+              <a:ext cx="597215" cy="517044"/>
+            </a:xfrm>
+            <a:prstGeom prst="rect">
+              <a:avLst/>
+            </a:prstGeom>
+          </p:spPr>
+        </p:pic>
+        <p:pic>
+          <p:nvPicPr>
+            <p:cNvPr id="7" name="그림 6"/>
+            <p:cNvPicPr>
+              <a:picLocks noChangeAspect="1"/>
+            </p:cNvPicPr>
+            <p:nvPr/>
+          </p:nvPicPr>
+          <p:blipFill>
+            <a:blip r:embed="rId5">
+              <a:extLst>
+                <a:ext uri="{28A0092B-C50C-407E-A947-70E740481C1C}">
+                  <a14:useLocalDpi xmlns:a14="http://schemas.microsoft.com/office/drawing/2010/main" val="0"/>
+                </a:ext>
+              </a:extLst>
+            </a:blip>
+            <a:stretch>
+              <a:fillRect/>
+            </a:stretch>
+          </p:blipFill>
+          <p:spPr>
+            <a:xfrm>
+              <a:off x="1241804" y="6322730"/>
+              <a:ext cx="438539" cy="438539"/>
+            </a:xfrm>
+            <a:prstGeom prst="rect">
+              <a:avLst/>
+            </a:prstGeom>
+          </p:spPr>
+        </p:pic>
+      </p:grpSp>
+      <p:sp>
+        <p:nvSpPr>
+          <p:cNvPr id="9" name="직사각형 8"/>
+          <p:cNvSpPr/>
+          <p:nvPr/>
+        </p:nvSpPr>
+        <p:spPr>
+          <a:xfrm>
+            <a:off x="0" y="0"/>
+            <a:ext cx="12192000" cy="102769"/>
+          </a:xfrm>
+          <a:prstGeom prst="rect">
+            <a:avLst/>
+          </a:prstGeom>
+          <a:solidFill>
+            <a:schemeClr val="accent6">
+              <a:lumMod val="60000"/>
+              <a:lumOff val="40000"/>
+            </a:schemeClr>
+          </a:solidFill>
+          <a:ln>
+            <a:noFill/>
+          </a:ln>
+        </p:spPr>
+        <p:style>
+          <a:lnRef idx="2">
+            <a:schemeClr val="accent1">
+              <a:shade val="50000"/>
+            </a:schemeClr>
+          </a:lnRef>
+          <a:fillRef idx="1">
+            <a:schemeClr val="accent1"/>
+          </a:fillRef>
+          <a:effectRef idx="0">
+            <a:schemeClr val="accent1"/>
+          </a:effectRef>
+          <a:fontRef idx="minor">
+            <a:schemeClr val="lt1"/>
+          </a:fontRef>
+        </p:style>
+        <p:txBody>
+          <a:bodyPr rtlCol="0" anchor="ctr"/>
+          <a:lstStyle/>
+          <a:p>
+            <a:pPr algn="ctr"/>
+            <a:endParaRPr kumimoji="1" lang="ko-KR" altLang="en-US" dirty="0">
+              <a:latin typeface="PT Sans Narrow" charset="-52"/>
+              <a:ea typeface="PT Sans Narrow" charset="-52"/>
+              <a:cs typeface="PT Sans Narrow" charset="-52"/>
+            </a:endParaRPr>
+          </a:p>
+        </p:txBody>
+      </p:sp>
+      <p:sp>
+        <p:nvSpPr>
+          <p:cNvPr id="11" name="직사각형 10"/>
+          <p:cNvSpPr/>
+          <p:nvPr/>
+        </p:nvSpPr>
+        <p:spPr>
+          <a:xfrm>
+            <a:off x="69202" y="6518941"/>
+            <a:ext cx="4169731" cy="261610"/>
+          </a:xfrm>
+          <a:prstGeom prst="rect">
+            <a:avLst/>
+          </a:prstGeom>
+        </p:spPr>
+        <p:txBody>
+          <a:bodyPr wrap="none">
+            <a:spAutoFit/>
+          </a:bodyPr>
+          <a:lstStyle/>
+          <a:p>
+            <a:r>
+              <a:rPr lang="en-US" altLang="ko-KR" sz="1100" dirty="0">
+                <a:latin typeface="Seravek Light" charset="0"/>
+                <a:ea typeface="Seravek Light" charset="0"/>
+                <a:cs typeface="Seravek Light" charset="0"/>
+              </a:rPr>
+              <a:t>CHOONG-WAN WOO  |  COCOAN lab  |  </a:t>
+            </a:r>
+            <a:r>
+              <a:rPr lang="en-US" altLang="ko-KR" sz="1100" dirty="0">
+                <a:latin typeface="Seravek Light" charset="0"/>
+                <a:ea typeface="Seravek Light" charset="0"/>
+                <a:cs typeface="Seravek Light" charset="0"/>
+                <a:hlinkClick r:id="rId6"/>
+              </a:rPr>
+              <a:t>http://cocoanlab.github.io</a:t>
+            </a:r>
+            <a:endParaRPr lang="en-US" altLang="ko-KR" sz="1100" dirty="0">
+              <a:latin typeface="Seravek Light" charset="0"/>
+              <a:ea typeface="Seravek Light" charset="0"/>
+              <a:cs typeface="Seravek Light" charset="0"/>
+            </a:endParaRPr>
+          </a:p>
+        </p:txBody>
+      </p:sp>
+      <p:sp>
+        <p:nvSpPr>
+          <p:cNvPr id="2" name="직사각형 1"/>
+          <p:cNvSpPr/>
+          <p:nvPr/>
+        </p:nvSpPr>
+        <p:spPr>
+          <a:xfrm>
+            <a:off x="216491" y="222608"/>
             <a:ext cx="6744988" cy="523220"/>
           </a:xfrm>
           <a:prstGeom prst="rect">
@@ -6257,7 +7722,7 @@
 </p:sld>
 </file>
 
-<file path=ppt/slides/slide11.xml><?xml version="1.0" encoding="utf-8"?>
+<file path=ppt/slides/slide12.xml><?xml version="1.0" encoding="utf-8"?>
 <p:sld xmlns:a="http://schemas.openxmlformats.org/drawingml/2006/main" xmlns:r="http://schemas.openxmlformats.org/officeDocument/2006/relationships" xmlns:p="http://schemas.openxmlformats.org/presentationml/2006/main">
   <p:cSld>
     <p:spTree>
@@ -8326,7 +9791,7 @@
 </p:sld>
 </file>
 
-<file path=ppt/slides/slide12.xml><?xml version="1.0" encoding="utf-8"?>
+<file path=ppt/slides/slide13.xml><?xml version="1.0" encoding="utf-8"?>
 <p:sld xmlns:a="http://schemas.openxmlformats.org/drawingml/2006/main" xmlns:r="http://schemas.openxmlformats.org/officeDocument/2006/relationships" xmlns:p="http://schemas.openxmlformats.org/presentationml/2006/main">
   <p:cSld>
     <p:spTree>
@@ -9981,7 +11446,7 @@
 </p:sld>
 </file>
 
-<file path=ppt/slides/slide13.xml><?xml version="1.0" encoding="utf-8"?>
+<file path=ppt/slides/slide14.xml><?xml version="1.0" encoding="utf-8"?>
 <p:sld xmlns:a="http://schemas.openxmlformats.org/drawingml/2006/main" xmlns:r="http://schemas.openxmlformats.org/officeDocument/2006/relationships" xmlns:p="http://schemas.openxmlformats.org/presentationml/2006/main">
   <p:cSld>
     <p:spTree>
@@ -10754,7 +12219,7 @@
 </p:sld>
 </file>
 
-<file path=ppt/slides/slide14.xml><?xml version="1.0" encoding="utf-8"?>
+<file path=ppt/slides/slide15.xml><?xml version="1.0" encoding="utf-8"?>
 <p:sld xmlns:a="http://schemas.openxmlformats.org/drawingml/2006/main" xmlns:r="http://schemas.openxmlformats.org/officeDocument/2006/relationships" xmlns:p="http://schemas.openxmlformats.org/presentationml/2006/main">
   <p:cSld>
     <p:spTree>
@@ -13207,8 +14672,8 @@
           </a:p>
         </p:txBody>
       </p:sp>
-      <mc:AlternateContent xmlns:mc="http://schemas.openxmlformats.org/markup-compatibility/2006" xmlns:a14="http://schemas.microsoft.com/office/drawing/2010/main">
-        <mc:Choice Requires="a14">
+      <mc:AlternateContent xmlns:mc="http://schemas.openxmlformats.org/markup-compatibility/2006">
+        <mc:Choice xmlns:a14="http://schemas.microsoft.com/office/drawing/2010/main" Requires="a14">
           <p:sp>
             <p:nvSpPr>
               <p:cNvPr id="12" name="텍스트 상자 11"/>
@@ -13217,8 +14682,8 @@
             </p:nvSpPr>
             <p:spPr>
               <a:xfrm>
-                <a:off x="1136286" y="989045"/>
-                <a:ext cx="10178812" cy="2308324"/>
+                <a:off x="1148576" y="3429000"/>
+                <a:ext cx="9108456" cy="2113271"/>
               </a:xfrm>
               <a:prstGeom prst="rect">
                 <a:avLst/>
@@ -13257,7 +14722,7 @@
                   <a:buChar char="•"/>
                 </a:pPr>
                 <a:r>
-                  <a:rPr lang="en-US" altLang="ko-KR" dirty="0">
+                  <a:rPr lang="en-US" altLang="ko-KR" sz="1600" dirty="0">
                     <a:latin typeface="Seravek Light" charset="0"/>
                     <a:ea typeface="Seravek Light" charset="0"/>
                     <a:cs typeface="Seravek Light" charset="0"/>
@@ -13267,7 +14732,7 @@
                 <a14:m>
                   <m:oMath xmlns:m="http://schemas.openxmlformats.org/officeDocument/2006/math">
                     <m:r>
-                      <a:rPr lang="en-US" altLang="ko-KR" i="1">
+                      <a:rPr lang="en-US" altLang="ko-KR" sz="1600" i="1">
                         <a:latin typeface="Cambria Math" charset="0"/>
                         <a:ea typeface="Cambria Math" charset="0"/>
                         <a:cs typeface="Cambria Math" charset="0"/>
@@ -13277,7 +14742,7 @@
                   </m:oMath>
                 </a14:m>
                 <a:r>
-                  <a:rPr lang="en-US" altLang="ko-KR" dirty="0">
+                  <a:rPr lang="en-US" altLang="ko-KR" sz="1600" dirty="0">
                     <a:latin typeface="Seravek Light" charset="0"/>
                     <a:ea typeface="Seravek Light" charset="0"/>
                     <a:cs typeface="Seravek Light" charset="0"/>
@@ -13294,7 +14759,7 @@
                   <a:buChar char="•"/>
                 </a:pPr>
                 <a:r>
-                  <a:rPr lang="en-US" altLang="ko-KR" b="1" dirty="0">
+                  <a:rPr lang="en-US" altLang="ko-KR" sz="1600" b="1" dirty="0">
                     <a:latin typeface="Seravek Light" charset="0"/>
                     <a:ea typeface="Seravek Light" charset="0"/>
                     <a:cs typeface="Seravek Light" charset="0"/>
@@ -13302,7 +14767,7 @@
                   <a:t>Four principles of experimental design: C</a:t>
                 </a:r>
                 <a:r>
-                  <a:rPr lang="en-US" altLang="ko-KR" dirty="0">
+                  <a:rPr lang="en-US" altLang="ko-KR" sz="1600" dirty="0">
                     <a:latin typeface="Seravek Light" charset="0"/>
                     <a:ea typeface="Seravek Light" charset="0"/>
                     <a:cs typeface="Seravek Light" charset="0"/>
@@ -13319,7 +14784,7 @@
                   <a:buChar char="•"/>
                 </a:pPr>
                 <a:r>
-                  <a:rPr lang="en-US" altLang="ko-KR" dirty="0">
+                  <a:rPr lang="en-US" altLang="ko-KR" sz="1600" dirty="0">
                     <a:latin typeface="Seravek Light" charset="0"/>
                     <a:ea typeface="Seravek Light" charset="0"/>
                     <a:cs typeface="Seravek Light" charset="0"/>
@@ -13336,7 +14801,7 @@
                   <a:buChar char="•"/>
                 </a:pPr>
                 <a:r>
-                  <a:rPr lang="en-US" altLang="ko-KR" dirty="0">
+                  <a:rPr lang="en-US" altLang="ko-KR" sz="1600" dirty="0">
                     <a:latin typeface="Seravek Light" charset="0"/>
                     <a:ea typeface="Seravek Light" charset="0"/>
                     <a:cs typeface="Seravek Light" charset="0"/>
@@ -13347,7 +14812,7 @@
             </p:txBody>
           </p:sp>
         </mc:Choice>
-        <mc:Fallback xmlns="">
+        <mc:Fallback>
           <p:sp>
             <p:nvSpPr>
               <p:cNvPr id="12" name="텍스트 상자 11"/>
@@ -13358,16 +14823,16 @@
             </p:nvSpPr>
             <p:spPr>
               <a:xfrm>
-                <a:off x="1136286" y="989045"/>
-                <a:ext cx="10178812" cy="2308324"/>
+                <a:off x="1148576" y="3429000"/>
+                <a:ext cx="9108456" cy="2113271"/>
               </a:xfrm>
               <a:prstGeom prst="rect">
                 <a:avLst/>
               </a:prstGeom>
-              <a:blipFill rotWithShape="0">
+              <a:blipFill>
                 <a:blip r:embed="rId6"/>
                 <a:stretch>
-                  <a:fillRect l="-479" b="-1319"/>
+                  <a:fillRect l="-417" b="-599"/>
                 </a:stretch>
               </a:blipFill>
             </p:spPr>
@@ -13424,6 +14889,134 @@
           </a:p>
         </p:txBody>
       </p:sp>
+      <p:sp>
+        <p:nvSpPr>
+          <p:cNvPr id="14" name="텍스트 상자 14">
+            <a:extLst>
+              <a:ext uri="{FF2B5EF4-FFF2-40B4-BE49-F238E27FC236}">
+                <a16:creationId xmlns:a16="http://schemas.microsoft.com/office/drawing/2014/main" id="{F5CA528D-B365-0E42-B9CE-35DEE23451CC}"/>
+              </a:ext>
+            </a:extLst>
+          </p:cNvPr>
+          <p:cNvSpPr txBox="1"/>
+          <p:nvPr/>
+        </p:nvSpPr>
+        <p:spPr>
+          <a:xfrm>
+            <a:off x="1148576" y="988584"/>
+            <a:ext cx="8294387" cy="2064027"/>
+          </a:xfrm>
+          <a:prstGeom prst="rect">
+            <a:avLst/>
+          </a:prstGeom>
+          <a:noFill/>
+        </p:spPr>
+        <p:txBody>
+          <a:bodyPr wrap="none" rtlCol="0">
+            <a:spAutoFit/>
+          </a:bodyPr>
+          <a:lstStyle/>
+          <a:p>
+            <a:pPr>
+              <a:lnSpc>
+                <a:spcPct val="160000"/>
+              </a:lnSpc>
+            </a:pPr>
+            <a:r>
+              <a:rPr lang="en-US" altLang="ko-KR" b="1" dirty="0">
+                <a:solidFill>
+                  <a:srgbClr val="002060"/>
+                </a:solidFill>
+                <a:latin typeface="Seravek Light" charset="0"/>
+                <a:ea typeface="Seravek Light" charset="0"/>
+                <a:cs typeface="Seravek Light" charset="0"/>
+              </a:rPr>
+              <a:t>Chapter 11 and 12: Randomness, Sampling</a:t>
+            </a:r>
+          </a:p>
+          <a:p>
+            <a:pPr marL="314325" indent="-314325">
+              <a:lnSpc>
+                <a:spcPct val="160000"/>
+              </a:lnSpc>
+              <a:buFont typeface="Arial" charset="0"/>
+              <a:buChar char="•"/>
+            </a:pPr>
+            <a:r>
+              <a:rPr lang="en-US" altLang="ko-KR" sz="1600" dirty="0">
+                <a:latin typeface="Seravek Light" charset="0"/>
+                <a:ea typeface="Seravek Light" charset="0"/>
+                <a:cs typeface="Seravek Light" charset="0"/>
+              </a:rPr>
+              <a:t>Population parameters vs. sample statistics</a:t>
+            </a:r>
+          </a:p>
+          <a:p>
+            <a:pPr marL="314325" indent="-314325">
+              <a:lnSpc>
+                <a:spcPct val="160000"/>
+              </a:lnSpc>
+              <a:buFont typeface="Arial" charset="0"/>
+              <a:buChar char="•"/>
+            </a:pPr>
+            <a:r>
+              <a:rPr lang="en-US" altLang="ko-KR" sz="1600" dirty="0">
+                <a:latin typeface="Seravek Light" charset="0"/>
+                <a:ea typeface="Seravek Light" charset="0"/>
+                <a:cs typeface="Seravek Light" charset="0"/>
+              </a:rPr>
+              <a:t>Sampling methods: </a:t>
+            </a:r>
+          </a:p>
+          <a:p>
+            <a:pPr marL="771525" lvl="1" indent="-314325">
+              <a:lnSpc>
+                <a:spcPct val="160000"/>
+              </a:lnSpc>
+              <a:buFont typeface="Arial" charset="0"/>
+              <a:buChar char="•"/>
+            </a:pPr>
+            <a:r>
+              <a:rPr lang="en-US" altLang="ko-KR" sz="1400" dirty="0">
+                <a:latin typeface="Seravek Light" charset="0"/>
+                <a:ea typeface="Seravek Light" charset="0"/>
+                <a:cs typeface="Seravek Light" charset="0"/>
+              </a:rPr>
+              <a:t>Simple sampling, stratified sampling, cluster sampling, multistage sampling, systematic sampling</a:t>
+            </a:r>
+          </a:p>
+          <a:p>
+            <a:pPr marL="314325" indent="-314325">
+              <a:lnSpc>
+                <a:spcPct val="160000"/>
+              </a:lnSpc>
+              <a:buFont typeface="Arial" charset="0"/>
+              <a:buChar char="•"/>
+            </a:pPr>
+            <a:r>
+              <a:rPr lang="en-US" altLang="ko-KR" sz="1600" dirty="0">
+                <a:latin typeface="Seravek Light" charset="0"/>
+                <a:ea typeface="Seravek Light" charset="0"/>
+                <a:cs typeface="Seravek Light" charset="0"/>
+              </a:rPr>
+              <a:t>Common mistakes in sampling</a:t>
+            </a:r>
+            <a:r>
+              <a:rPr lang="mr-IN" altLang="ko-KR" sz="1600" dirty="0">
+                <a:latin typeface="Seravek Light" charset="0"/>
+                <a:ea typeface="Seravek Light" charset="0"/>
+                <a:cs typeface="Seravek Light" charset="0"/>
+              </a:rPr>
+              <a:t>…</a:t>
+            </a:r>
+            <a:endParaRPr lang="en-US" altLang="ko-KR" sz="1600" dirty="0">
+              <a:latin typeface="Seravek Light" charset="0"/>
+              <a:ea typeface="Seravek Light" charset="0"/>
+              <a:cs typeface="Seravek Light" charset="0"/>
+            </a:endParaRPr>
+          </a:p>
+        </p:txBody>
+      </p:sp>
     </p:spTree>
     <p:extLst>
       <p:ext uri="{BB962C8B-B14F-4D97-AF65-F5344CB8AC3E}">
@@ -13434,235 +15027,6 @@
   <p:clrMapOvr>
     <a:masterClrMapping/>
   </p:clrMapOvr>
-  <p:timing>
-    <p:tnLst>
-      <p:par>
-        <p:cTn id="1" dur="indefinite" restart="never" nodeType="tmRoot">
-          <p:childTnLst>
-            <p:seq concurrent="1" nextAc="seek">
-              <p:cTn id="2" dur="indefinite" nodeType="mainSeq">
-                <p:childTnLst>
-                  <p:par>
-                    <p:cTn id="3" fill="hold">
-                      <p:stCondLst>
-                        <p:cond delay="indefinite"/>
-                      </p:stCondLst>
-                      <p:childTnLst>
-                        <p:par>
-                          <p:cTn id="4" fill="hold">
-                            <p:stCondLst>
-                              <p:cond delay="0"/>
-                            </p:stCondLst>
-                            <p:childTnLst>
-                              <p:par>
-                                <p:cTn id="5" presetID="1" presetClass="entr" presetSubtype="0" fill="hold" grpId="0" nodeType="clickEffect">
-                                  <p:stCondLst>
-                                    <p:cond delay="0"/>
-                                  </p:stCondLst>
-                                  <p:childTnLst>
-                                    <p:set>
-                                      <p:cBhvr>
-                                        <p:cTn id="6" dur="1" fill="hold">
-                                          <p:stCondLst>
-                                            <p:cond delay="0"/>
-                                          </p:stCondLst>
-                                        </p:cTn>
-                                        <p:tgtEl>
-                                          <p:spTgt spid="12">
-                                            <p:txEl>
-                                              <p:pRg st="1" end="1"/>
-                                            </p:txEl>
-                                          </p:spTgt>
-                                        </p:tgtEl>
-                                        <p:attrNameLst>
-                                          <p:attrName>style.visibility</p:attrName>
-                                        </p:attrNameLst>
-                                      </p:cBhvr>
-                                      <p:to>
-                                        <p:strVal val="visible"/>
-                                      </p:to>
-                                    </p:set>
-                                  </p:childTnLst>
-                                </p:cTn>
-                              </p:par>
-                            </p:childTnLst>
-                          </p:cTn>
-                        </p:par>
-                      </p:childTnLst>
-                    </p:cTn>
-                  </p:par>
-                  <p:par>
-                    <p:cTn id="7" fill="hold">
-                      <p:stCondLst>
-                        <p:cond delay="indefinite"/>
-                      </p:stCondLst>
-                      <p:childTnLst>
-                        <p:par>
-                          <p:cTn id="8" fill="hold">
-                            <p:stCondLst>
-                              <p:cond delay="0"/>
-                            </p:stCondLst>
-                            <p:childTnLst>
-                              <p:par>
-                                <p:cTn id="9" presetID="1" presetClass="entr" presetSubtype="0" fill="hold" grpId="0" nodeType="clickEffect">
-                                  <p:stCondLst>
-                                    <p:cond delay="0"/>
-                                  </p:stCondLst>
-                                  <p:childTnLst>
-                                    <p:set>
-                                      <p:cBhvr>
-                                        <p:cTn id="10" dur="1" fill="hold">
-                                          <p:stCondLst>
-                                            <p:cond delay="0"/>
-                                          </p:stCondLst>
-                                        </p:cTn>
-                                        <p:tgtEl>
-                                          <p:spTgt spid="12">
-                                            <p:txEl>
-                                              <p:pRg st="2" end="2"/>
-                                            </p:txEl>
-                                          </p:spTgt>
-                                        </p:tgtEl>
-                                        <p:attrNameLst>
-                                          <p:attrName>style.visibility</p:attrName>
-                                        </p:attrNameLst>
-                                      </p:cBhvr>
-                                      <p:to>
-                                        <p:strVal val="visible"/>
-                                      </p:to>
-                                    </p:set>
-                                  </p:childTnLst>
-                                </p:cTn>
-                              </p:par>
-                            </p:childTnLst>
-                          </p:cTn>
-                        </p:par>
-                      </p:childTnLst>
-                    </p:cTn>
-                  </p:par>
-                  <p:par>
-                    <p:cTn id="11" fill="hold">
-                      <p:stCondLst>
-                        <p:cond delay="indefinite"/>
-                      </p:stCondLst>
-                      <p:childTnLst>
-                        <p:par>
-                          <p:cTn id="12" fill="hold">
-                            <p:stCondLst>
-                              <p:cond delay="0"/>
-                            </p:stCondLst>
-                            <p:childTnLst>
-                              <p:par>
-                                <p:cTn id="13" presetID="1" presetClass="entr" presetSubtype="0" fill="hold" grpId="0" nodeType="clickEffect">
-                                  <p:stCondLst>
-                                    <p:cond delay="0"/>
-                                  </p:stCondLst>
-                                  <p:childTnLst>
-                                    <p:set>
-                                      <p:cBhvr>
-                                        <p:cTn id="14" dur="1" fill="hold">
-                                          <p:stCondLst>
-                                            <p:cond delay="0"/>
-                                          </p:stCondLst>
-                                        </p:cTn>
-                                        <p:tgtEl>
-                                          <p:spTgt spid="12">
-                                            <p:txEl>
-                                              <p:pRg st="3" end="3"/>
-                                            </p:txEl>
-                                          </p:spTgt>
-                                        </p:tgtEl>
-                                        <p:attrNameLst>
-                                          <p:attrName>style.visibility</p:attrName>
-                                        </p:attrNameLst>
-                                      </p:cBhvr>
-                                      <p:to>
-                                        <p:strVal val="visible"/>
-                                      </p:to>
-                                    </p:set>
-                                  </p:childTnLst>
-                                </p:cTn>
-                              </p:par>
-                            </p:childTnLst>
-                          </p:cTn>
-                        </p:par>
-                      </p:childTnLst>
-                    </p:cTn>
-                  </p:par>
-                  <p:par>
-                    <p:cTn id="15" fill="hold">
-                      <p:stCondLst>
-                        <p:cond delay="indefinite"/>
-                      </p:stCondLst>
-                      <p:childTnLst>
-                        <p:par>
-                          <p:cTn id="16" fill="hold">
-                            <p:stCondLst>
-                              <p:cond delay="0"/>
-                            </p:stCondLst>
-                            <p:childTnLst>
-                              <p:par>
-                                <p:cTn id="17" presetID="1" presetClass="entr" presetSubtype="0" fill="hold" grpId="0" nodeType="clickEffect">
-                                  <p:stCondLst>
-                                    <p:cond delay="0"/>
-                                  </p:stCondLst>
-                                  <p:childTnLst>
-                                    <p:set>
-                                      <p:cBhvr>
-                                        <p:cTn id="18" dur="1" fill="hold">
-                                          <p:stCondLst>
-                                            <p:cond delay="0"/>
-                                          </p:stCondLst>
-                                        </p:cTn>
-                                        <p:tgtEl>
-                                          <p:spTgt spid="12">
-                                            <p:txEl>
-                                              <p:pRg st="4" end="4"/>
-                                            </p:txEl>
-                                          </p:spTgt>
-                                        </p:tgtEl>
-                                        <p:attrNameLst>
-                                          <p:attrName>style.visibility</p:attrName>
-                                        </p:attrNameLst>
-                                      </p:cBhvr>
-                                      <p:to>
-                                        <p:strVal val="visible"/>
-                                      </p:to>
-                                    </p:set>
-                                  </p:childTnLst>
-                                </p:cTn>
-                              </p:par>
-                            </p:childTnLst>
-                          </p:cTn>
-                        </p:par>
-                      </p:childTnLst>
-                    </p:cTn>
-                  </p:par>
-                </p:childTnLst>
-              </p:cTn>
-              <p:prevCondLst>
-                <p:cond evt="onPrev" delay="0">
-                  <p:tgtEl>
-                    <p:sldTgt/>
-                  </p:tgtEl>
-                </p:cond>
-              </p:prevCondLst>
-              <p:nextCondLst>
-                <p:cond evt="onNext" delay="0">
-                  <p:tgtEl>
-                    <p:sldTgt/>
-                  </p:tgtEl>
-                </p:cond>
-              </p:nextCondLst>
-            </p:seq>
-          </p:childTnLst>
-        </p:cTn>
-      </p:par>
-    </p:tnLst>
-    <p:bldLst>
-      <p:bldP spid="12" grpId="0" uiExpand="1" build="p"/>
-    </p:bldLst>
-  </p:timing>
 </p:sld>
 </file>
 
@@ -15792,6 +17156,858 @@
         <p:spPr>
           <a:xfrm>
             <a:off x="216491" y="222608"/>
+            <a:ext cx="4515980" cy="523220"/>
+          </a:xfrm>
+          <a:prstGeom prst="rect">
+            <a:avLst/>
+          </a:prstGeom>
+        </p:spPr>
+        <p:txBody>
+          <a:bodyPr wrap="none">
+            <a:spAutoFit/>
+          </a:bodyPr>
+          <a:lstStyle/>
+          <a:p>
+            <a:r>
+              <a:rPr lang="en-US" altLang="ko-KR" sz="2800" dirty="0">
+                <a:latin typeface="Seravek" charset="0"/>
+                <a:ea typeface="Seravek" charset="0"/>
+                <a:cs typeface="Seravek" charset="0"/>
+              </a:rPr>
+              <a:t>Law of Large Numbers (LLN)</a:t>
+            </a:r>
+          </a:p>
+        </p:txBody>
+      </p:sp>
+      <p:sp>
+        <p:nvSpPr>
+          <p:cNvPr id="12" name="직사각형 11">
+            <a:extLst>
+              <a:ext uri="{FF2B5EF4-FFF2-40B4-BE49-F238E27FC236}">
+                <a16:creationId xmlns:a16="http://schemas.microsoft.com/office/drawing/2014/main" id="{797F23DB-9BCA-A247-92E0-7B726F17B4AF}"/>
+              </a:ext>
+            </a:extLst>
+          </p:cNvPr>
+          <p:cNvSpPr/>
+          <p:nvPr/>
+        </p:nvSpPr>
+        <p:spPr>
+          <a:xfrm>
+            <a:off x="9894433" y="84109"/>
+            <a:ext cx="2301508" cy="276999"/>
+          </a:xfrm>
+          <a:prstGeom prst="rect">
+            <a:avLst/>
+          </a:prstGeom>
+        </p:spPr>
+        <p:txBody>
+          <a:bodyPr wrap="square">
+            <a:spAutoFit/>
+          </a:bodyPr>
+          <a:lstStyle/>
+          <a:p>
+            <a:pPr algn="r"/>
+            <a:r>
+              <a:rPr lang="en-US" altLang="ko-KR" sz="1200" dirty="0">
+                <a:latin typeface="Seravek Light" charset="0"/>
+                <a:ea typeface="Seravek Light" charset="0"/>
+                <a:cs typeface="Seravek Light" charset="0"/>
+              </a:rPr>
+              <a:t>Lecture 10</a:t>
+            </a:r>
+            <a:endParaRPr lang="ko-KR" altLang="en-US" sz="1200" dirty="0">
+              <a:latin typeface="Seravek Light" charset="0"/>
+              <a:ea typeface="Seravek Light" charset="0"/>
+              <a:cs typeface="Seravek Light" charset="0"/>
+            </a:endParaRPr>
+          </a:p>
+        </p:txBody>
+      </p:sp>
+      <p:pic>
+        <p:nvPicPr>
+          <p:cNvPr id="3" name="그림 2">
+            <a:extLst>
+              <a:ext uri="{FF2B5EF4-FFF2-40B4-BE49-F238E27FC236}">
+                <a16:creationId xmlns:a16="http://schemas.microsoft.com/office/drawing/2014/main" id="{E1940D88-C7C1-C642-90EF-6E31A8A2EEBA}"/>
+              </a:ext>
+            </a:extLst>
+          </p:cNvPr>
+          <p:cNvPicPr>
+            <a:picLocks noChangeAspect="1"/>
+          </p:cNvPicPr>
+          <p:nvPr/>
+        </p:nvPicPr>
+        <p:blipFill>
+          <a:blip r:embed="rId6"/>
+          <a:stretch>
+            <a:fillRect/>
+          </a:stretch>
+        </p:blipFill>
+        <p:spPr>
+          <a:xfrm>
+            <a:off x="2846832" y="935619"/>
+            <a:ext cx="6025134" cy="3680693"/>
+          </a:xfrm>
+          <a:prstGeom prst="rect">
+            <a:avLst/>
+          </a:prstGeom>
+        </p:spPr>
+      </p:pic>
+      <p:grpSp>
+        <p:nvGrpSpPr>
+          <p:cNvPr id="14" name="그룹 13">
+            <a:extLst>
+              <a:ext uri="{FF2B5EF4-FFF2-40B4-BE49-F238E27FC236}">
+                <a16:creationId xmlns:a16="http://schemas.microsoft.com/office/drawing/2014/main" id="{502567D1-7D83-3340-B006-D718359C6C01}"/>
+              </a:ext>
+            </a:extLst>
+          </p:cNvPr>
+          <p:cNvGrpSpPr/>
+          <p:nvPr/>
+        </p:nvGrpSpPr>
+        <p:grpSpPr>
+          <a:xfrm>
+            <a:off x="3456432" y="1024128"/>
+            <a:ext cx="2075676" cy="2298192"/>
+            <a:chOff x="3456432" y="1024128"/>
+            <a:chExt cx="2075676" cy="2298192"/>
+          </a:xfrm>
+        </p:grpSpPr>
+        <p:sp>
+          <p:nvSpPr>
+            <p:cNvPr id="4" name="직사각형 3">
+              <a:extLst>
+                <a:ext uri="{FF2B5EF4-FFF2-40B4-BE49-F238E27FC236}">
+                  <a16:creationId xmlns:a16="http://schemas.microsoft.com/office/drawing/2014/main" id="{DAFB80DD-5522-F44B-9986-CFA154F3378D}"/>
+                </a:ext>
+              </a:extLst>
+            </p:cNvPr>
+            <p:cNvSpPr/>
+            <p:nvPr/>
+          </p:nvSpPr>
+          <p:spPr>
+            <a:xfrm>
+              <a:off x="3456432" y="1024128"/>
+              <a:ext cx="782501" cy="2298192"/>
+            </a:xfrm>
+            <a:prstGeom prst="rect">
+              <a:avLst/>
+            </a:prstGeom>
+            <a:noFill/>
+            <a:ln w="19050">
+              <a:solidFill>
+                <a:srgbClr val="C00000"/>
+              </a:solidFill>
+            </a:ln>
+          </p:spPr>
+          <p:style>
+            <a:lnRef idx="2">
+              <a:schemeClr val="accent1">
+                <a:shade val="50000"/>
+              </a:schemeClr>
+            </a:lnRef>
+            <a:fillRef idx="1">
+              <a:schemeClr val="accent1"/>
+            </a:fillRef>
+            <a:effectRef idx="0">
+              <a:schemeClr val="accent1"/>
+            </a:effectRef>
+            <a:fontRef idx="minor">
+              <a:schemeClr val="lt1"/>
+            </a:fontRef>
+          </p:style>
+          <p:txBody>
+            <a:bodyPr rtlCol="0" anchor="ctr"/>
+            <a:lstStyle/>
+            <a:p>
+              <a:pPr algn="ctr"/>
+              <a:endParaRPr kumimoji="1" lang="ko-KR" altLang="en-US"/>
+            </a:p>
+          </p:txBody>
+        </p:sp>
+        <p:sp>
+          <p:nvSpPr>
+            <p:cNvPr id="13" name="직사각형 12">
+              <a:extLst>
+                <a:ext uri="{FF2B5EF4-FFF2-40B4-BE49-F238E27FC236}">
+                  <a16:creationId xmlns:a16="http://schemas.microsoft.com/office/drawing/2014/main" id="{AB7219A8-A5C2-5A47-9F0B-04236737EECA}"/>
+                </a:ext>
+              </a:extLst>
+            </p:cNvPr>
+            <p:cNvSpPr/>
+            <p:nvPr/>
+          </p:nvSpPr>
+          <p:spPr>
+            <a:xfrm>
+              <a:off x="4238933" y="1024128"/>
+              <a:ext cx="1293175" cy="307777"/>
+            </a:xfrm>
+            <a:prstGeom prst="rect">
+              <a:avLst/>
+            </a:prstGeom>
+          </p:spPr>
+          <p:txBody>
+            <a:bodyPr wrap="none">
+              <a:spAutoFit/>
+            </a:bodyPr>
+            <a:lstStyle/>
+            <a:p>
+              <a:r>
+                <a:rPr lang="en-US" altLang="ko-KR" sz="1400" dirty="0">
+                  <a:solidFill>
+                    <a:srgbClr val="C00000"/>
+                  </a:solidFill>
+                  <a:latin typeface="Seravek Light" charset="0"/>
+                  <a:ea typeface="Seravek Light" charset="0"/>
+                  <a:cs typeface="Seravek Light" charset="0"/>
+                </a:rPr>
+                <a:t>Highly variable</a:t>
+              </a:r>
+              <a:endParaRPr lang="ko-KR" altLang="en-US" sz="1400" dirty="0">
+                <a:solidFill>
+                  <a:srgbClr val="C00000"/>
+                </a:solidFill>
+              </a:endParaRPr>
+            </a:p>
+          </p:txBody>
+        </p:sp>
+      </p:grpSp>
+      <p:sp>
+        <p:nvSpPr>
+          <p:cNvPr id="15" name="직사각형 14">
+            <a:extLst>
+              <a:ext uri="{FF2B5EF4-FFF2-40B4-BE49-F238E27FC236}">
+                <a16:creationId xmlns:a16="http://schemas.microsoft.com/office/drawing/2014/main" id="{B9F1203D-AEBA-6A44-AF51-2A0732E85DC5}"/>
+              </a:ext>
+            </a:extLst>
+          </p:cNvPr>
+          <p:cNvSpPr/>
+          <p:nvPr/>
+        </p:nvSpPr>
+        <p:spPr>
+          <a:xfrm>
+            <a:off x="967826" y="4739254"/>
+            <a:ext cx="10986430" cy="1626086"/>
+          </a:xfrm>
+          <a:prstGeom prst="rect">
+            <a:avLst/>
+          </a:prstGeom>
+        </p:spPr>
+        <p:txBody>
+          <a:bodyPr wrap="square">
+            <a:spAutoFit/>
+          </a:bodyPr>
+          <a:lstStyle/>
+          <a:p>
+            <a:pPr marL="314325" indent="-314325">
+              <a:lnSpc>
+                <a:spcPct val="160000"/>
+              </a:lnSpc>
+              <a:buFont typeface="Arial" charset="0"/>
+              <a:buChar char="•"/>
+            </a:pPr>
+            <a:r>
+              <a:rPr lang="en-US" altLang="ko-KR" sz="1600" dirty="0">
+                <a:latin typeface="Seravek Light" charset="0"/>
+                <a:ea typeface="Seravek Light" charset="0"/>
+                <a:cs typeface="Seravek Light" charset="0"/>
+              </a:rPr>
+              <a:t>Many people forget this and overinterpret results from small samples: </a:t>
+            </a:r>
+            <a:r>
+              <a:rPr lang="en-US" altLang="ko-KR" sz="1600" i="1" dirty="0">
+                <a:latin typeface="Seravek Light" charset="0"/>
+                <a:ea typeface="Seravek Light" charset="0"/>
+                <a:cs typeface="Seravek Light" charset="0"/>
+              </a:rPr>
+              <a:t>Law of small numbers </a:t>
+            </a:r>
+            <a:r>
+              <a:rPr lang="en-US" altLang="ko-KR" sz="1400" dirty="0">
+                <a:latin typeface="Seravek Light" charset="0"/>
+                <a:ea typeface="Seravek Light" charset="0"/>
+                <a:cs typeface="Seravek Light" charset="0"/>
+              </a:rPr>
+              <a:t>(Tversky and Kahneman)</a:t>
+            </a:r>
+          </a:p>
+          <a:p>
+            <a:pPr marL="314325" indent="-314325">
+              <a:lnSpc>
+                <a:spcPct val="160000"/>
+              </a:lnSpc>
+              <a:buFont typeface="Arial" charset="0"/>
+              <a:buChar char="•"/>
+            </a:pPr>
+            <a:r>
+              <a:rPr lang="en-US" altLang="ko-KR" sz="1600" dirty="0">
+                <a:latin typeface="Seravek Light" charset="0"/>
+                <a:ea typeface="Seravek Light" charset="0"/>
+                <a:cs typeface="Seravek Light" charset="0"/>
+              </a:rPr>
+              <a:t>One of the major sources for the recent replication crisis!</a:t>
+            </a:r>
+            <a:endParaRPr lang="en-US" altLang="ko-KR" dirty="0">
+              <a:latin typeface="Seravek Light" charset="0"/>
+              <a:ea typeface="Seravek Light" charset="0"/>
+              <a:cs typeface="Seravek Light" charset="0"/>
+            </a:endParaRPr>
+          </a:p>
+          <a:p>
+            <a:pPr marL="314325" indent="-314325">
+              <a:lnSpc>
+                <a:spcPct val="160000"/>
+              </a:lnSpc>
+              <a:buFont typeface="Arial" charset="0"/>
+              <a:buChar char="•"/>
+            </a:pPr>
+            <a:r>
+              <a:rPr lang="en-US" altLang="ko-KR" sz="1600" dirty="0">
+                <a:latin typeface="Seravek Light" charset="0"/>
+                <a:ea typeface="Seravek Light" charset="0"/>
+                <a:cs typeface="Seravek Light" charset="0"/>
+                <a:hlinkClick r:id="rId7"/>
+              </a:rPr>
+              <a:t>https://www.nature.com/collections/prbfkwmwvz</a:t>
+            </a:r>
+            <a:endParaRPr lang="en-US" altLang="ko-KR" sz="1600" dirty="0">
+              <a:latin typeface="Seravek Light" charset="0"/>
+              <a:ea typeface="Seravek Light" charset="0"/>
+              <a:cs typeface="Seravek Light" charset="0"/>
+            </a:endParaRPr>
+          </a:p>
+          <a:p>
+            <a:pPr marL="314325" indent="-314325">
+              <a:lnSpc>
+                <a:spcPct val="160000"/>
+              </a:lnSpc>
+              <a:buFont typeface="Arial" charset="0"/>
+              <a:buChar char="•"/>
+            </a:pPr>
+            <a:endParaRPr lang="en-US" altLang="ko-KR" sz="1600" dirty="0">
+              <a:latin typeface="Seravek Light" charset="0"/>
+              <a:ea typeface="Seravek Light" charset="0"/>
+              <a:cs typeface="Seravek Light" charset="0"/>
+            </a:endParaRPr>
+          </a:p>
+        </p:txBody>
+      </p:sp>
+      <p:pic>
+        <p:nvPicPr>
+          <p:cNvPr id="10" name="그림 9">
+            <a:extLst>
+              <a:ext uri="{FF2B5EF4-FFF2-40B4-BE49-F238E27FC236}">
+                <a16:creationId xmlns:a16="http://schemas.microsoft.com/office/drawing/2014/main" id="{20163F38-B081-914D-A0A9-1F9C40BFC095}"/>
+              </a:ext>
+            </a:extLst>
+          </p:cNvPr>
+          <p:cNvPicPr>
+            <a:picLocks noChangeAspect="1"/>
+          </p:cNvPicPr>
+          <p:nvPr/>
+        </p:nvPicPr>
+        <p:blipFill>
+          <a:blip r:embed="rId8"/>
+          <a:stretch>
+            <a:fillRect/>
+          </a:stretch>
+        </p:blipFill>
+        <p:spPr>
+          <a:xfrm>
+            <a:off x="7443035" y="5286201"/>
+            <a:ext cx="4019162" cy="2904019"/>
+          </a:xfrm>
+          <a:prstGeom prst="rect">
+            <a:avLst/>
+          </a:prstGeom>
+        </p:spPr>
+      </p:pic>
+    </p:spTree>
+    <p:extLst>
+      <p:ext uri="{BB962C8B-B14F-4D97-AF65-F5344CB8AC3E}">
+        <p14:creationId xmlns:p14="http://schemas.microsoft.com/office/powerpoint/2010/main" val="2001248727"/>
+      </p:ext>
+    </p:extLst>
+  </p:cSld>
+  <p:clrMapOvr>
+    <a:masterClrMapping/>
+  </p:clrMapOvr>
+  <p:timing>
+    <p:tnLst>
+      <p:par>
+        <p:cTn id="1" dur="indefinite" restart="never" nodeType="tmRoot">
+          <p:childTnLst>
+            <p:seq concurrent="1" nextAc="seek">
+              <p:cTn id="2" dur="indefinite" nodeType="mainSeq">
+                <p:childTnLst>
+                  <p:par>
+                    <p:cTn id="3" fill="hold">
+                      <p:stCondLst>
+                        <p:cond delay="indefinite"/>
+                      </p:stCondLst>
+                      <p:childTnLst>
+                        <p:par>
+                          <p:cTn id="4" fill="hold">
+                            <p:stCondLst>
+                              <p:cond delay="0"/>
+                            </p:stCondLst>
+                            <p:childTnLst>
+                              <p:par>
+                                <p:cTn id="5" presetID="1" presetClass="entr" presetSubtype="0" fill="hold" nodeType="clickEffect">
+                                  <p:stCondLst>
+                                    <p:cond delay="0"/>
+                                  </p:stCondLst>
+                                  <p:childTnLst>
+                                    <p:set>
+                                      <p:cBhvr>
+                                        <p:cTn id="6" dur="1" fill="hold">
+                                          <p:stCondLst>
+                                            <p:cond delay="0"/>
+                                          </p:stCondLst>
+                                        </p:cTn>
+                                        <p:tgtEl>
+                                          <p:spTgt spid="14"/>
+                                        </p:tgtEl>
+                                        <p:attrNameLst>
+                                          <p:attrName>style.visibility</p:attrName>
+                                        </p:attrNameLst>
+                                      </p:cBhvr>
+                                      <p:to>
+                                        <p:strVal val="visible"/>
+                                      </p:to>
+                                    </p:set>
+                                  </p:childTnLst>
+                                </p:cTn>
+                              </p:par>
+                            </p:childTnLst>
+                          </p:cTn>
+                        </p:par>
+                      </p:childTnLst>
+                    </p:cTn>
+                  </p:par>
+                  <p:par>
+                    <p:cTn id="7" fill="hold">
+                      <p:stCondLst>
+                        <p:cond delay="indefinite"/>
+                      </p:stCondLst>
+                      <p:childTnLst>
+                        <p:par>
+                          <p:cTn id="8" fill="hold">
+                            <p:stCondLst>
+                              <p:cond delay="0"/>
+                            </p:stCondLst>
+                            <p:childTnLst>
+                              <p:par>
+                                <p:cTn id="9" presetID="1" presetClass="entr" presetSubtype="0" fill="hold" nodeType="clickEffect">
+                                  <p:stCondLst>
+                                    <p:cond delay="0"/>
+                                  </p:stCondLst>
+                                  <p:childTnLst>
+                                    <p:set>
+                                      <p:cBhvr>
+                                        <p:cTn id="10" dur="1" fill="hold">
+                                          <p:stCondLst>
+                                            <p:cond delay="0"/>
+                                          </p:stCondLst>
+                                        </p:cTn>
+                                        <p:tgtEl>
+                                          <p:spTgt spid="15">
+                                            <p:txEl>
+                                              <p:pRg st="0" end="0"/>
+                                            </p:txEl>
+                                          </p:spTgt>
+                                        </p:tgtEl>
+                                        <p:attrNameLst>
+                                          <p:attrName>style.visibility</p:attrName>
+                                        </p:attrNameLst>
+                                      </p:cBhvr>
+                                      <p:to>
+                                        <p:strVal val="visible"/>
+                                      </p:to>
+                                    </p:set>
+                                  </p:childTnLst>
+                                </p:cTn>
+                              </p:par>
+                            </p:childTnLst>
+                          </p:cTn>
+                        </p:par>
+                      </p:childTnLst>
+                    </p:cTn>
+                  </p:par>
+                  <p:par>
+                    <p:cTn id="11" fill="hold">
+                      <p:stCondLst>
+                        <p:cond delay="indefinite"/>
+                      </p:stCondLst>
+                      <p:childTnLst>
+                        <p:par>
+                          <p:cTn id="12" fill="hold">
+                            <p:stCondLst>
+                              <p:cond delay="0"/>
+                            </p:stCondLst>
+                            <p:childTnLst>
+                              <p:par>
+                                <p:cTn id="13" presetID="1" presetClass="entr" presetSubtype="0" fill="hold" nodeType="clickEffect">
+                                  <p:stCondLst>
+                                    <p:cond delay="0"/>
+                                  </p:stCondLst>
+                                  <p:childTnLst>
+                                    <p:set>
+                                      <p:cBhvr>
+                                        <p:cTn id="14" dur="1" fill="hold">
+                                          <p:stCondLst>
+                                            <p:cond delay="0"/>
+                                          </p:stCondLst>
+                                        </p:cTn>
+                                        <p:tgtEl>
+                                          <p:spTgt spid="15">
+                                            <p:txEl>
+                                              <p:pRg st="1" end="1"/>
+                                            </p:txEl>
+                                          </p:spTgt>
+                                        </p:tgtEl>
+                                        <p:attrNameLst>
+                                          <p:attrName>style.visibility</p:attrName>
+                                        </p:attrNameLst>
+                                      </p:cBhvr>
+                                      <p:to>
+                                        <p:strVal val="visible"/>
+                                      </p:to>
+                                    </p:set>
+                                  </p:childTnLst>
+                                </p:cTn>
+                              </p:par>
+                            </p:childTnLst>
+                          </p:cTn>
+                        </p:par>
+                      </p:childTnLst>
+                    </p:cTn>
+                  </p:par>
+                  <p:par>
+                    <p:cTn id="15" fill="hold">
+                      <p:stCondLst>
+                        <p:cond delay="indefinite"/>
+                      </p:stCondLst>
+                      <p:childTnLst>
+                        <p:par>
+                          <p:cTn id="16" fill="hold">
+                            <p:stCondLst>
+                              <p:cond delay="0"/>
+                            </p:stCondLst>
+                            <p:childTnLst>
+                              <p:par>
+                                <p:cTn id="17" presetID="1" presetClass="entr" presetSubtype="0" fill="hold" nodeType="clickEffect">
+                                  <p:stCondLst>
+                                    <p:cond delay="0"/>
+                                  </p:stCondLst>
+                                  <p:childTnLst>
+                                    <p:set>
+                                      <p:cBhvr>
+                                        <p:cTn id="18" dur="1" fill="hold">
+                                          <p:stCondLst>
+                                            <p:cond delay="0"/>
+                                          </p:stCondLst>
+                                        </p:cTn>
+                                        <p:tgtEl>
+                                          <p:spTgt spid="15">
+                                            <p:txEl>
+                                              <p:pRg st="2" end="2"/>
+                                            </p:txEl>
+                                          </p:spTgt>
+                                        </p:tgtEl>
+                                        <p:attrNameLst>
+                                          <p:attrName>style.visibility</p:attrName>
+                                        </p:attrNameLst>
+                                      </p:cBhvr>
+                                      <p:to>
+                                        <p:strVal val="visible"/>
+                                      </p:to>
+                                    </p:set>
+                                  </p:childTnLst>
+                                </p:cTn>
+                              </p:par>
+                              <p:par>
+                                <p:cTn id="19" presetID="1" presetClass="entr" presetSubtype="0" fill="hold" nodeType="withEffect">
+                                  <p:stCondLst>
+                                    <p:cond delay="0"/>
+                                  </p:stCondLst>
+                                  <p:childTnLst>
+                                    <p:set>
+                                      <p:cBhvr>
+                                        <p:cTn id="20" dur="1" fill="hold">
+                                          <p:stCondLst>
+                                            <p:cond delay="0"/>
+                                          </p:stCondLst>
+                                        </p:cTn>
+                                        <p:tgtEl>
+                                          <p:spTgt spid="10"/>
+                                        </p:tgtEl>
+                                        <p:attrNameLst>
+                                          <p:attrName>style.visibility</p:attrName>
+                                        </p:attrNameLst>
+                                      </p:cBhvr>
+                                      <p:to>
+                                        <p:strVal val="visible"/>
+                                      </p:to>
+                                    </p:set>
+                                  </p:childTnLst>
+                                </p:cTn>
+                              </p:par>
+                            </p:childTnLst>
+                          </p:cTn>
+                        </p:par>
+                      </p:childTnLst>
+                    </p:cTn>
+                  </p:par>
+                </p:childTnLst>
+              </p:cTn>
+              <p:prevCondLst>
+                <p:cond evt="onPrev" delay="0">
+                  <p:tgtEl>
+                    <p:sldTgt/>
+                  </p:tgtEl>
+                </p:cond>
+              </p:prevCondLst>
+              <p:nextCondLst>
+                <p:cond evt="onNext" delay="0">
+                  <p:tgtEl>
+                    <p:sldTgt/>
+                  </p:tgtEl>
+                </p:cond>
+              </p:nextCondLst>
+            </p:seq>
+          </p:childTnLst>
+        </p:cTn>
+      </p:par>
+    </p:tnLst>
+  </p:timing>
+</p:sld>
+</file>
+
+<file path=ppt/slides/slide6.xml><?xml version="1.0" encoding="utf-8"?>
+<p:sld xmlns:a="http://schemas.openxmlformats.org/drawingml/2006/main" xmlns:r="http://schemas.openxmlformats.org/officeDocument/2006/relationships" xmlns:p="http://schemas.openxmlformats.org/presentationml/2006/main">
+  <p:cSld>
+    <p:spTree>
+      <p:nvGrpSpPr>
+        <p:cNvPr id="1" name=""/>
+        <p:cNvGrpSpPr/>
+        <p:nvPr/>
+      </p:nvGrpSpPr>
+      <p:grpSpPr>
+        <a:xfrm>
+          <a:off x="0" y="0"/>
+          <a:ext cx="0" cy="0"/>
+          <a:chOff x="0" y="0"/>
+          <a:chExt cx="0" cy="0"/>
+        </a:xfrm>
+      </p:grpSpPr>
+      <p:grpSp>
+        <p:nvGrpSpPr>
+          <p:cNvPr id="8" name="그룹 7"/>
+          <p:cNvGrpSpPr/>
+          <p:nvPr/>
+        </p:nvGrpSpPr>
+        <p:grpSpPr>
+          <a:xfrm>
+            <a:off x="10422294" y="6186196"/>
+            <a:ext cx="1661681" cy="671804"/>
+            <a:chOff x="18662" y="6209254"/>
+            <a:chExt cx="1661681" cy="671804"/>
+          </a:xfrm>
+        </p:grpSpPr>
+        <p:pic>
+          <p:nvPicPr>
+            <p:cNvPr id="5" name="그림 4"/>
+            <p:cNvPicPr>
+              <a:picLocks noChangeAspect="1"/>
+            </p:cNvPicPr>
+            <p:nvPr/>
+          </p:nvPicPr>
+          <p:blipFill>
+            <a:blip r:embed="rId2">
+              <a:extLst>
+                <a:ext uri="{28A0092B-C50C-407E-A947-70E740481C1C}">
+                  <a14:useLocalDpi xmlns:a14="http://schemas.microsoft.com/office/drawing/2010/main" val="0"/>
+                </a:ext>
+              </a:extLst>
+            </a:blip>
+            <a:stretch>
+              <a:fillRect/>
+            </a:stretch>
+          </p:blipFill>
+          <p:spPr>
+            <a:xfrm>
+              <a:off x="18662" y="6209254"/>
+              <a:ext cx="671804" cy="671804"/>
+            </a:xfrm>
+            <a:prstGeom prst="rect">
+              <a:avLst/>
+            </a:prstGeom>
+          </p:spPr>
+        </p:pic>
+        <p:pic>
+          <p:nvPicPr>
+            <p:cNvPr id="6" name="그림 5"/>
+            <p:cNvPicPr>
+              <a:picLocks noChangeAspect="1"/>
+            </p:cNvPicPr>
+            <p:nvPr/>
+          </p:nvPicPr>
+          <p:blipFill>
+            <a:blip r:embed="rId3"/>
+            <a:stretch>
+              <a:fillRect/>
+            </a:stretch>
+          </p:blipFill>
+          <p:spPr>
+            <a:xfrm>
+              <a:off x="625149" y="6262887"/>
+              <a:ext cx="597215" cy="517044"/>
+            </a:xfrm>
+            <a:prstGeom prst="rect">
+              <a:avLst/>
+            </a:prstGeom>
+          </p:spPr>
+        </p:pic>
+        <p:pic>
+          <p:nvPicPr>
+            <p:cNvPr id="7" name="그림 6"/>
+            <p:cNvPicPr>
+              <a:picLocks noChangeAspect="1"/>
+            </p:cNvPicPr>
+            <p:nvPr/>
+          </p:nvPicPr>
+          <p:blipFill>
+            <a:blip r:embed="rId4">
+              <a:extLst>
+                <a:ext uri="{28A0092B-C50C-407E-A947-70E740481C1C}">
+                  <a14:useLocalDpi xmlns:a14="http://schemas.microsoft.com/office/drawing/2010/main" val="0"/>
+                </a:ext>
+              </a:extLst>
+            </a:blip>
+            <a:stretch>
+              <a:fillRect/>
+            </a:stretch>
+          </p:blipFill>
+          <p:spPr>
+            <a:xfrm>
+              <a:off x="1241804" y="6322730"/>
+              <a:ext cx="438539" cy="438539"/>
+            </a:xfrm>
+            <a:prstGeom prst="rect">
+              <a:avLst/>
+            </a:prstGeom>
+          </p:spPr>
+        </p:pic>
+      </p:grpSp>
+      <p:sp>
+        <p:nvSpPr>
+          <p:cNvPr id="9" name="직사각형 8"/>
+          <p:cNvSpPr/>
+          <p:nvPr/>
+        </p:nvSpPr>
+        <p:spPr>
+          <a:xfrm>
+            <a:off x="0" y="0"/>
+            <a:ext cx="12192000" cy="102769"/>
+          </a:xfrm>
+          <a:prstGeom prst="rect">
+            <a:avLst/>
+          </a:prstGeom>
+          <a:solidFill>
+            <a:schemeClr val="accent6">
+              <a:lumMod val="60000"/>
+              <a:lumOff val="40000"/>
+            </a:schemeClr>
+          </a:solidFill>
+          <a:ln>
+            <a:noFill/>
+          </a:ln>
+        </p:spPr>
+        <p:style>
+          <a:lnRef idx="2">
+            <a:schemeClr val="accent1">
+              <a:shade val="50000"/>
+            </a:schemeClr>
+          </a:lnRef>
+          <a:fillRef idx="1">
+            <a:schemeClr val="accent1"/>
+          </a:fillRef>
+          <a:effectRef idx="0">
+            <a:schemeClr val="accent1"/>
+          </a:effectRef>
+          <a:fontRef idx="minor">
+            <a:schemeClr val="lt1"/>
+          </a:fontRef>
+        </p:style>
+        <p:txBody>
+          <a:bodyPr rtlCol="0" anchor="ctr"/>
+          <a:lstStyle/>
+          <a:p>
+            <a:pPr algn="ctr"/>
+            <a:endParaRPr kumimoji="1" lang="ko-KR" altLang="en-US" dirty="0">
+              <a:latin typeface="PT Sans Narrow" charset="-52"/>
+              <a:ea typeface="PT Sans Narrow" charset="-52"/>
+              <a:cs typeface="PT Sans Narrow" charset="-52"/>
+            </a:endParaRPr>
+          </a:p>
+        </p:txBody>
+      </p:sp>
+      <p:sp>
+        <p:nvSpPr>
+          <p:cNvPr id="11" name="직사각형 10"/>
+          <p:cNvSpPr/>
+          <p:nvPr/>
+        </p:nvSpPr>
+        <p:spPr>
+          <a:xfrm>
+            <a:off x="69202" y="6518941"/>
+            <a:ext cx="4169731" cy="261610"/>
+          </a:xfrm>
+          <a:prstGeom prst="rect">
+            <a:avLst/>
+          </a:prstGeom>
+        </p:spPr>
+        <p:txBody>
+          <a:bodyPr wrap="none">
+            <a:spAutoFit/>
+          </a:bodyPr>
+          <a:lstStyle/>
+          <a:p>
+            <a:r>
+              <a:rPr lang="en-US" altLang="ko-KR" sz="1100" dirty="0">
+                <a:latin typeface="Seravek Light" charset="0"/>
+                <a:ea typeface="Seravek Light" charset="0"/>
+                <a:cs typeface="Seravek Light" charset="0"/>
+              </a:rPr>
+              <a:t>CHOONG-WAN WOO  |  COCOAN lab  |  </a:t>
+            </a:r>
+            <a:r>
+              <a:rPr lang="en-US" altLang="ko-KR" sz="1100" dirty="0">
+                <a:latin typeface="Seravek Light" charset="0"/>
+                <a:ea typeface="Seravek Light" charset="0"/>
+                <a:cs typeface="Seravek Light" charset="0"/>
+                <a:hlinkClick r:id="rId5"/>
+              </a:rPr>
+              <a:t>http://cocoanlab.github.io</a:t>
+            </a:r>
+            <a:endParaRPr lang="en-US" altLang="ko-KR" sz="1100" dirty="0">
+              <a:latin typeface="Seravek Light" charset="0"/>
+              <a:ea typeface="Seravek Light" charset="0"/>
+              <a:cs typeface="Seravek Light" charset="0"/>
+            </a:endParaRPr>
+          </a:p>
+        </p:txBody>
+      </p:sp>
+      <p:sp>
+        <p:nvSpPr>
+          <p:cNvPr id="2" name="직사각형 1"/>
+          <p:cNvSpPr/>
+          <p:nvPr/>
+        </p:nvSpPr>
+        <p:spPr>
+          <a:xfrm>
+            <a:off x="216491" y="222608"/>
             <a:ext cx="4275529" cy="523220"/>
           </a:xfrm>
           <a:prstGeom prst="rect">
@@ -16851,7 +19067,7 @@
 </p:sld>
 </file>
 
-<file path=ppt/slides/slide6.xml><?xml version="1.0" encoding="utf-8"?>
+<file path=ppt/slides/slide7.xml><?xml version="1.0" encoding="utf-8"?>
 <p:sld xmlns:a="http://schemas.openxmlformats.org/drawingml/2006/main" xmlns:r="http://schemas.openxmlformats.org/officeDocument/2006/relationships" xmlns:p="http://schemas.openxmlformats.org/presentationml/2006/main">
   <p:cSld>
     <p:spTree>
@@ -18742,7 +20958,7 @@
 </p:sld>
 </file>
 
-<file path=ppt/slides/slide7.xml><?xml version="1.0" encoding="utf-8"?>
+<file path=ppt/slides/slide8.xml><?xml version="1.0" encoding="utf-8"?>
 <p:sld xmlns:a="http://schemas.openxmlformats.org/drawingml/2006/main" xmlns:r="http://schemas.openxmlformats.org/officeDocument/2006/relationships" xmlns:p="http://schemas.openxmlformats.org/presentationml/2006/main">
   <p:cSld>
     <p:spTree>
@@ -19675,7 +21891,7 @@
 </p:sld>
 </file>
 
-<file path=ppt/slides/slide8.xml><?xml version="1.0" encoding="utf-8"?>
+<file path=ppt/slides/slide9.xml><?xml version="1.0" encoding="utf-8"?>
 <p:sld xmlns:a="http://schemas.openxmlformats.org/drawingml/2006/main" xmlns:r="http://schemas.openxmlformats.org/officeDocument/2006/relationships" xmlns:p="http://schemas.openxmlformats.org/presentationml/2006/main">
   <p:cSld>
     <p:spTree>
@@ -21019,1470 +23235,6 @@
                                         </p:cTn>
                                         <p:tgtEl>
                                           <p:spTgt spid="15"/>
-                                        </p:tgtEl>
-                                        <p:attrNameLst>
-                                          <p:attrName>style.visibility</p:attrName>
-                                        </p:attrNameLst>
-                                      </p:cBhvr>
-                                      <p:to>
-                                        <p:strVal val="visible"/>
-                                      </p:to>
-                                    </p:set>
-                                  </p:childTnLst>
-                                </p:cTn>
-                              </p:par>
-                            </p:childTnLst>
-                          </p:cTn>
-                        </p:par>
-                      </p:childTnLst>
-                    </p:cTn>
-                  </p:par>
-                </p:childTnLst>
-              </p:cTn>
-              <p:prevCondLst>
-                <p:cond evt="onPrev" delay="0">
-                  <p:tgtEl>
-                    <p:sldTgt/>
-                  </p:tgtEl>
-                </p:cond>
-              </p:prevCondLst>
-              <p:nextCondLst>
-                <p:cond evt="onNext" delay="0">
-                  <p:tgtEl>
-                    <p:sldTgt/>
-                  </p:tgtEl>
-                </p:cond>
-              </p:nextCondLst>
-            </p:seq>
-          </p:childTnLst>
-        </p:cTn>
-      </p:par>
-    </p:tnLst>
-    <p:bldLst>
-      <p:bldP spid="14" grpId="0" uiExpand="1" build="p"/>
-    </p:bldLst>
-  </p:timing>
-</p:sld>
-</file>
-
-<file path=ppt/slides/slide9.xml><?xml version="1.0" encoding="utf-8"?>
-<p:sld xmlns:a="http://schemas.openxmlformats.org/drawingml/2006/main" xmlns:r="http://schemas.openxmlformats.org/officeDocument/2006/relationships" xmlns:p="http://schemas.openxmlformats.org/presentationml/2006/main">
-  <p:cSld>
-    <p:spTree>
-      <p:nvGrpSpPr>
-        <p:cNvPr id="1" name=""/>
-        <p:cNvGrpSpPr/>
-        <p:nvPr/>
-      </p:nvGrpSpPr>
-      <p:grpSpPr>
-        <a:xfrm>
-          <a:off x="0" y="0"/>
-          <a:ext cx="0" cy="0"/>
-          <a:chOff x="0" y="0"/>
-          <a:chExt cx="0" cy="0"/>
-        </a:xfrm>
-      </p:grpSpPr>
-      <p:grpSp>
-        <p:nvGrpSpPr>
-          <p:cNvPr id="8" name="그룹 7"/>
-          <p:cNvGrpSpPr/>
-          <p:nvPr/>
-        </p:nvGrpSpPr>
-        <p:grpSpPr>
-          <a:xfrm>
-            <a:off x="10422294" y="6186196"/>
-            <a:ext cx="1661681" cy="671804"/>
-            <a:chOff x="18662" y="6209254"/>
-            <a:chExt cx="1661681" cy="671804"/>
-          </a:xfrm>
-        </p:grpSpPr>
-        <p:pic>
-          <p:nvPicPr>
-            <p:cNvPr id="5" name="그림 4"/>
-            <p:cNvPicPr>
-              <a:picLocks noChangeAspect="1"/>
-            </p:cNvPicPr>
-            <p:nvPr/>
-          </p:nvPicPr>
-          <p:blipFill>
-            <a:blip r:embed="rId3">
-              <a:extLst>
-                <a:ext uri="{28A0092B-C50C-407E-A947-70E740481C1C}">
-                  <a14:useLocalDpi xmlns:a14="http://schemas.microsoft.com/office/drawing/2010/main" val="0"/>
-                </a:ext>
-              </a:extLst>
-            </a:blip>
-            <a:stretch>
-              <a:fillRect/>
-            </a:stretch>
-          </p:blipFill>
-          <p:spPr>
-            <a:xfrm>
-              <a:off x="18662" y="6209254"/>
-              <a:ext cx="671804" cy="671804"/>
-            </a:xfrm>
-            <a:prstGeom prst="rect">
-              <a:avLst/>
-            </a:prstGeom>
-          </p:spPr>
-        </p:pic>
-        <p:pic>
-          <p:nvPicPr>
-            <p:cNvPr id="6" name="그림 5"/>
-            <p:cNvPicPr>
-              <a:picLocks noChangeAspect="1"/>
-            </p:cNvPicPr>
-            <p:nvPr/>
-          </p:nvPicPr>
-          <p:blipFill>
-            <a:blip r:embed="rId4"/>
-            <a:stretch>
-              <a:fillRect/>
-            </a:stretch>
-          </p:blipFill>
-          <p:spPr>
-            <a:xfrm>
-              <a:off x="625149" y="6262887"/>
-              <a:ext cx="597215" cy="517044"/>
-            </a:xfrm>
-            <a:prstGeom prst="rect">
-              <a:avLst/>
-            </a:prstGeom>
-          </p:spPr>
-        </p:pic>
-        <p:pic>
-          <p:nvPicPr>
-            <p:cNvPr id="7" name="그림 6"/>
-            <p:cNvPicPr>
-              <a:picLocks noChangeAspect="1"/>
-            </p:cNvPicPr>
-            <p:nvPr/>
-          </p:nvPicPr>
-          <p:blipFill>
-            <a:blip r:embed="rId5">
-              <a:extLst>
-                <a:ext uri="{28A0092B-C50C-407E-A947-70E740481C1C}">
-                  <a14:useLocalDpi xmlns:a14="http://schemas.microsoft.com/office/drawing/2010/main" val="0"/>
-                </a:ext>
-              </a:extLst>
-            </a:blip>
-            <a:stretch>
-              <a:fillRect/>
-            </a:stretch>
-          </p:blipFill>
-          <p:spPr>
-            <a:xfrm>
-              <a:off x="1241804" y="6322730"/>
-              <a:ext cx="438539" cy="438539"/>
-            </a:xfrm>
-            <a:prstGeom prst="rect">
-              <a:avLst/>
-            </a:prstGeom>
-          </p:spPr>
-        </p:pic>
-      </p:grpSp>
-      <p:sp>
-        <p:nvSpPr>
-          <p:cNvPr id="9" name="직사각형 8"/>
-          <p:cNvSpPr/>
-          <p:nvPr/>
-        </p:nvSpPr>
-        <p:spPr>
-          <a:xfrm>
-            <a:off x="0" y="0"/>
-            <a:ext cx="12192000" cy="102769"/>
-          </a:xfrm>
-          <a:prstGeom prst="rect">
-            <a:avLst/>
-          </a:prstGeom>
-          <a:solidFill>
-            <a:schemeClr val="accent6">
-              <a:lumMod val="60000"/>
-              <a:lumOff val="40000"/>
-            </a:schemeClr>
-          </a:solidFill>
-          <a:ln>
-            <a:noFill/>
-          </a:ln>
-        </p:spPr>
-        <p:style>
-          <a:lnRef idx="2">
-            <a:schemeClr val="accent1">
-              <a:shade val="50000"/>
-            </a:schemeClr>
-          </a:lnRef>
-          <a:fillRef idx="1">
-            <a:schemeClr val="accent1"/>
-          </a:fillRef>
-          <a:effectRef idx="0">
-            <a:schemeClr val="accent1"/>
-          </a:effectRef>
-          <a:fontRef idx="minor">
-            <a:schemeClr val="lt1"/>
-          </a:fontRef>
-        </p:style>
-        <p:txBody>
-          <a:bodyPr rtlCol="0" anchor="ctr"/>
-          <a:lstStyle/>
-          <a:p>
-            <a:pPr algn="ctr"/>
-            <a:endParaRPr kumimoji="1" lang="ko-KR" altLang="en-US" dirty="0">
-              <a:latin typeface="PT Sans Narrow" charset="-52"/>
-              <a:ea typeface="PT Sans Narrow" charset="-52"/>
-              <a:cs typeface="PT Sans Narrow" charset="-52"/>
-            </a:endParaRPr>
-          </a:p>
-        </p:txBody>
-      </p:sp>
-      <p:sp>
-        <p:nvSpPr>
-          <p:cNvPr id="11" name="직사각형 10"/>
-          <p:cNvSpPr/>
-          <p:nvPr/>
-        </p:nvSpPr>
-        <p:spPr>
-          <a:xfrm>
-            <a:off x="69202" y="6518941"/>
-            <a:ext cx="4169731" cy="261610"/>
-          </a:xfrm>
-          <a:prstGeom prst="rect">
-            <a:avLst/>
-          </a:prstGeom>
-        </p:spPr>
-        <p:txBody>
-          <a:bodyPr wrap="none">
-            <a:spAutoFit/>
-          </a:bodyPr>
-          <a:lstStyle/>
-          <a:p>
-            <a:r>
-              <a:rPr lang="en-US" altLang="ko-KR" sz="1100" dirty="0">
-                <a:latin typeface="Seravek Light" charset="0"/>
-                <a:ea typeface="Seravek Light" charset="0"/>
-                <a:cs typeface="Seravek Light" charset="0"/>
-              </a:rPr>
-              <a:t>CHOONG-WAN WOO  |  COCOAN lab  |  </a:t>
-            </a:r>
-            <a:r>
-              <a:rPr lang="en-US" altLang="ko-KR" sz="1100" dirty="0">
-                <a:latin typeface="Seravek Light" charset="0"/>
-                <a:ea typeface="Seravek Light" charset="0"/>
-                <a:cs typeface="Seravek Light" charset="0"/>
-                <a:hlinkClick r:id="rId6"/>
-              </a:rPr>
-              <a:t>http://cocoanlab.github.io</a:t>
-            </a:r>
-            <a:endParaRPr lang="en-US" altLang="ko-KR" sz="1100" dirty="0">
-              <a:latin typeface="Seravek Light" charset="0"/>
-              <a:ea typeface="Seravek Light" charset="0"/>
-              <a:cs typeface="Seravek Light" charset="0"/>
-            </a:endParaRPr>
-          </a:p>
-        </p:txBody>
-      </p:sp>
-      <p:sp>
-        <p:nvSpPr>
-          <p:cNvPr id="2" name="직사각형 1"/>
-          <p:cNvSpPr/>
-          <p:nvPr/>
-        </p:nvSpPr>
-        <p:spPr>
-          <a:xfrm>
-            <a:off x="216491" y="222608"/>
-            <a:ext cx="2315057" cy="523220"/>
-          </a:xfrm>
-          <a:prstGeom prst="rect">
-            <a:avLst/>
-          </a:prstGeom>
-        </p:spPr>
-        <p:txBody>
-          <a:bodyPr wrap="none">
-            <a:spAutoFit/>
-          </a:bodyPr>
-          <a:lstStyle/>
-          <a:p>
-            <a:r>
-              <a:rPr lang="en-US" altLang="ko-KR" sz="2800" dirty="0">
-                <a:latin typeface="Seravek" charset="0"/>
-                <a:ea typeface="Seravek" charset="0"/>
-                <a:cs typeface="Seravek" charset="0"/>
-              </a:rPr>
-              <a:t>Independence</a:t>
-            </a:r>
-            <a:endParaRPr lang="ko-KR" altLang="en-US" sz="2800" dirty="0">
-              <a:latin typeface="Seravek" charset="0"/>
-              <a:ea typeface="Seravek" charset="0"/>
-              <a:cs typeface="Seravek" charset="0"/>
-            </a:endParaRPr>
-          </a:p>
-        </p:txBody>
-      </p:sp>
-      <mc:AlternateContent xmlns:mc="http://schemas.openxmlformats.org/markup-compatibility/2006" xmlns:a14="http://schemas.microsoft.com/office/drawing/2010/main">
-        <mc:Choice Requires="a14">
-          <p:sp>
-            <p:nvSpPr>
-              <p:cNvPr id="14" name="텍스트 상자 13"/>
-              <p:cNvSpPr txBox="1"/>
-              <p:nvPr/>
-            </p:nvSpPr>
-            <p:spPr>
-              <a:xfrm>
-                <a:off x="1136287" y="989045"/>
-                <a:ext cx="10657608" cy="3831818"/>
-              </a:xfrm>
-              <a:prstGeom prst="rect">
-                <a:avLst/>
-              </a:prstGeom>
-              <a:noFill/>
-            </p:spPr>
-            <p:txBody>
-              <a:bodyPr wrap="square" rtlCol="0">
-                <a:spAutoFit/>
-              </a:bodyPr>
-              <a:lstStyle/>
-              <a:p>
-                <a:pPr marL="314325" indent="-314325">
-                  <a:lnSpc>
-                    <a:spcPct val="150000"/>
-                  </a:lnSpc>
-                  <a:buFont typeface="Arial" charset="0"/>
-                  <a:buChar char="•"/>
-                </a:pPr>
-                <a:r>
-                  <a:rPr lang="en-US" altLang="ko-KR" dirty="0">
-                    <a:latin typeface="Seravek Light" charset="0"/>
-                    <a:ea typeface="Seravek Light" charset="0"/>
-                    <a:cs typeface="Seravek Light" charset="0"/>
-                  </a:rPr>
-                  <a:t>Events </a:t>
-                </a:r>
-                <a:r>
-                  <a:rPr lang="en-US" altLang="ko-KR" b="1" dirty="0">
-                    <a:latin typeface="Seravek Light" charset="0"/>
-                    <a:ea typeface="Seravek Light" charset="0"/>
-                    <a:cs typeface="Seravek Light" charset="0"/>
-                  </a:rPr>
-                  <a:t>A</a:t>
-                </a:r>
-                <a:r>
-                  <a:rPr lang="en-US" altLang="ko-KR" dirty="0">
-                    <a:latin typeface="Seravek Light" charset="0"/>
-                    <a:ea typeface="Seravek Light" charset="0"/>
-                    <a:cs typeface="Seravek Light" charset="0"/>
-                  </a:rPr>
-                  <a:t> and </a:t>
-                </a:r>
-                <a:r>
-                  <a:rPr lang="en-US" altLang="ko-KR" b="1" dirty="0">
-                    <a:latin typeface="Seravek Light" charset="0"/>
-                    <a:ea typeface="Seravek Light" charset="0"/>
-                    <a:cs typeface="Seravek Light" charset="0"/>
-                  </a:rPr>
-                  <a:t>B</a:t>
-                </a:r>
-                <a:r>
-                  <a:rPr lang="en-US" altLang="ko-KR" dirty="0">
-                    <a:latin typeface="Seravek Light" charset="0"/>
-                    <a:ea typeface="Seravek Light" charset="0"/>
-                    <a:cs typeface="Seravek Light" charset="0"/>
-                  </a:rPr>
-                  <a:t> are independent if and only if:</a:t>
-                </a:r>
-              </a:p>
-              <a:p>
-                <a:pPr marL="771525" lvl="1" indent="-314325">
-                  <a:lnSpc>
-                    <a:spcPct val="150000"/>
-                  </a:lnSpc>
-                  <a:buFont typeface="Wingdings" charset="2"/>
-                  <a:buChar char="§"/>
-                </a:pPr>
-                <a14:m>
-                  <m:oMath xmlns:m="http://schemas.openxmlformats.org/officeDocument/2006/math">
-                    <m:r>
-                      <a:rPr lang="en-US" altLang="ko-KR" b="0" i="1" smtClean="0">
-                        <a:latin typeface="Cambria Math" charset="0"/>
-                        <a:ea typeface="Seravek Light" charset="0"/>
-                        <a:cs typeface="Seravek Light" charset="0"/>
-                      </a:rPr>
-                      <m:t>𝑃</m:t>
-                    </m:r>
-                    <m:d>
-                      <m:dPr>
-                        <m:ctrlPr>
-                          <a:rPr lang="en-US" altLang="ko-KR" b="0" i="1" smtClean="0">
-                            <a:latin typeface="Cambria Math" panose="02040503050406030204" pitchFamily="18" charset="0"/>
-                            <a:ea typeface="Seravek Light" charset="0"/>
-                            <a:cs typeface="Seravek Light" charset="0"/>
-                          </a:rPr>
-                        </m:ctrlPr>
-                      </m:dPr>
-                      <m:e>
-                        <m:r>
-                          <a:rPr lang="en-US" altLang="ko-KR" b="1" i="0" smtClean="0">
-                            <a:latin typeface="Cambria Math" charset="0"/>
-                            <a:ea typeface="Seravek Light" charset="0"/>
-                            <a:cs typeface="Seravek Light" charset="0"/>
-                          </a:rPr>
-                          <m:t>𝐁</m:t>
-                        </m:r>
-                      </m:e>
-                      <m:e>
-                        <m:r>
-                          <a:rPr lang="en-US" altLang="ko-KR" b="1" i="0" smtClean="0">
-                            <a:latin typeface="Cambria Math" charset="0"/>
-                            <a:ea typeface="Seravek Light" charset="0"/>
-                            <a:cs typeface="Seravek Light" charset="0"/>
-                          </a:rPr>
-                          <m:t>𝐀</m:t>
-                        </m:r>
-                      </m:e>
-                    </m:d>
-                    <m:r>
-                      <a:rPr lang="en-US" altLang="ko-KR" b="0" i="1" smtClean="0">
-                        <a:latin typeface="Cambria Math" charset="0"/>
-                        <a:ea typeface="Seravek Light" charset="0"/>
-                        <a:cs typeface="Seravek Light" charset="0"/>
-                      </a:rPr>
-                      <m:t>=</m:t>
-                    </m:r>
-                    <m:r>
-                      <a:rPr lang="en-US" altLang="ko-KR" b="0" i="1" smtClean="0">
-                        <a:latin typeface="Cambria Math" charset="0"/>
-                        <a:ea typeface="Seravek Light" charset="0"/>
-                        <a:cs typeface="Seravek Light" charset="0"/>
-                      </a:rPr>
-                      <m:t>𝑃</m:t>
-                    </m:r>
-                    <m:d>
-                      <m:dPr>
-                        <m:ctrlPr>
-                          <a:rPr lang="en-US" altLang="ko-KR" b="0" i="1" smtClean="0">
-                            <a:latin typeface="Cambria Math" panose="02040503050406030204" pitchFamily="18" charset="0"/>
-                            <a:ea typeface="Seravek Light" charset="0"/>
-                            <a:cs typeface="Seravek Light" charset="0"/>
-                          </a:rPr>
-                        </m:ctrlPr>
-                      </m:dPr>
-                      <m:e>
-                        <m:r>
-                          <a:rPr lang="en-US" altLang="ko-KR" b="1" i="0" smtClean="0">
-                            <a:latin typeface="Cambria Math" charset="0"/>
-                            <a:ea typeface="Seravek Light" charset="0"/>
-                            <a:cs typeface="Seravek Light" charset="0"/>
-                          </a:rPr>
-                          <m:t>𝐁</m:t>
-                        </m:r>
-                      </m:e>
-                    </m:d>
-                  </m:oMath>
-                </a14:m>
-                <a:endParaRPr lang="en-US" altLang="ko-KR" b="0" dirty="0">
-                  <a:latin typeface="Seravek Light" charset="0"/>
-                  <a:ea typeface="Seravek Light" charset="0"/>
-                  <a:cs typeface="Seravek Light" charset="0"/>
-                </a:endParaRPr>
-              </a:p>
-              <a:p>
-                <a:pPr marL="314325" indent="-314325">
-                  <a:lnSpc>
-                    <a:spcPct val="150000"/>
-                  </a:lnSpc>
-                  <a:buFont typeface="Arial" charset="0"/>
-                  <a:buChar char="•"/>
-                </a:pPr>
-                <a:endParaRPr lang="en-US" altLang="ko-KR" b="0" dirty="0">
-                  <a:latin typeface="Seravek Light" charset="0"/>
-                  <a:ea typeface="Seravek Light" charset="0"/>
-                  <a:cs typeface="Seravek Light" charset="0"/>
-                </a:endParaRPr>
-              </a:p>
-              <a:p>
-                <a:pPr marL="314325" indent="-314325">
-                  <a:lnSpc>
-                    <a:spcPct val="150000"/>
-                  </a:lnSpc>
-                  <a:buFont typeface="Arial" charset="0"/>
-                  <a:buChar char="•"/>
-                </a:pPr>
-                <a:r>
-                  <a:rPr lang="en-US" altLang="ko-KR" dirty="0">
-                    <a:latin typeface="Seravek Light" charset="0"/>
-                    <a:ea typeface="Seravek Light" charset="0"/>
-                    <a:cs typeface="Seravek Light" charset="0"/>
-                  </a:rPr>
-                  <a:t>Thus, if A and B are independent, </a:t>
-                </a:r>
-              </a:p>
-              <a:p>
-                <a:pPr marL="771525" lvl="1" indent="-314325">
-                  <a:lnSpc>
-                    <a:spcPct val="150000"/>
-                  </a:lnSpc>
-                  <a:buFont typeface="Wingdings" charset="2"/>
-                  <a:buChar char="§"/>
-                </a:pPr>
-                <a14:m>
-                  <m:oMath xmlns:m="http://schemas.openxmlformats.org/officeDocument/2006/math">
-                    <m:r>
-                      <a:rPr lang="en-US" altLang="ko-KR" b="0" i="1" smtClean="0">
-                        <a:solidFill>
-                          <a:schemeClr val="tx1"/>
-                        </a:solidFill>
-                        <a:latin typeface="Cambria Math" charset="0"/>
-                        <a:ea typeface="Seravek Light" charset="0"/>
-                        <a:cs typeface="Seravek Light" charset="0"/>
-                      </a:rPr>
-                      <m:t>𝑃</m:t>
-                    </m:r>
-                    <m:d>
-                      <m:dPr>
-                        <m:ctrlPr>
-                          <a:rPr lang="en-US" altLang="ko-KR" i="1">
-                            <a:solidFill>
-                              <a:schemeClr val="tx1"/>
-                            </a:solidFill>
-                            <a:latin typeface="Cambria Math" panose="02040503050406030204" pitchFamily="18" charset="0"/>
-                            <a:ea typeface="Seravek Light" charset="0"/>
-                            <a:cs typeface="Seravek Light" charset="0"/>
-                          </a:rPr>
-                        </m:ctrlPr>
-                      </m:dPr>
-                      <m:e>
-                        <m:r>
-                          <a:rPr lang="en-US" altLang="ko-KR" b="1">
-                            <a:solidFill>
-                              <a:schemeClr val="tx1"/>
-                            </a:solidFill>
-                            <a:latin typeface="Cambria Math" charset="0"/>
-                            <a:ea typeface="Seravek Light" charset="0"/>
-                            <a:cs typeface="Seravek Light" charset="0"/>
-                          </a:rPr>
-                          <m:t>𝐀</m:t>
-                        </m:r>
-                        <m:r>
-                          <a:rPr lang="en-US" altLang="ko-KR" i="1">
-                            <a:solidFill>
-                              <a:schemeClr val="tx1"/>
-                            </a:solidFill>
-                            <a:latin typeface="Cambria Math" charset="0"/>
-                            <a:ea typeface="Seravek Light" charset="0"/>
-                            <a:cs typeface="Seravek Light" charset="0"/>
-                          </a:rPr>
-                          <m:t> </m:t>
-                        </m:r>
-                        <m:r>
-                          <a:rPr lang="en-US" altLang="ko-KR" i="1">
-                            <a:solidFill>
-                              <a:schemeClr val="tx1"/>
-                            </a:solidFill>
-                            <a:latin typeface="Cambria Math" charset="0"/>
-                            <a:ea typeface="Seravek Light" charset="0"/>
-                            <a:cs typeface="Seravek Light" charset="0"/>
-                          </a:rPr>
-                          <m:t>𝑎𝑛𝑑</m:t>
-                        </m:r>
-                        <m:r>
-                          <a:rPr lang="en-US" altLang="ko-KR" i="1">
-                            <a:solidFill>
-                              <a:schemeClr val="tx1"/>
-                            </a:solidFill>
-                            <a:latin typeface="Cambria Math" charset="0"/>
-                            <a:ea typeface="Seravek Light" charset="0"/>
-                            <a:cs typeface="Seravek Light" charset="0"/>
-                          </a:rPr>
-                          <m:t> </m:t>
-                        </m:r>
-                        <m:r>
-                          <a:rPr lang="en-US" altLang="ko-KR" b="1">
-                            <a:solidFill>
-                              <a:schemeClr val="tx1"/>
-                            </a:solidFill>
-                            <a:latin typeface="Cambria Math" charset="0"/>
-                            <a:ea typeface="Seravek Light" charset="0"/>
-                            <a:cs typeface="Seravek Light" charset="0"/>
-                          </a:rPr>
-                          <m:t>𝐁</m:t>
-                        </m:r>
-                      </m:e>
-                    </m:d>
-                    <m:r>
-                      <a:rPr lang="en-US" altLang="ko-KR" i="1">
-                        <a:solidFill>
-                          <a:schemeClr val="tx1"/>
-                        </a:solidFill>
-                        <a:latin typeface="Cambria Math" charset="0"/>
-                        <a:ea typeface="Seravek Light" charset="0"/>
-                        <a:cs typeface="Seravek Light" charset="0"/>
-                      </a:rPr>
-                      <m:t>=</m:t>
-                    </m:r>
-                    <m:r>
-                      <a:rPr lang="en-US" altLang="ko-KR" b="0" i="1">
-                        <a:solidFill>
-                          <a:schemeClr val="tx1"/>
-                        </a:solidFill>
-                        <a:latin typeface="Cambria Math" charset="0"/>
-                        <a:ea typeface="Seravek Light" charset="0"/>
-                        <a:cs typeface="Seravek Light" charset="0"/>
-                      </a:rPr>
-                      <m:t>𝑃</m:t>
-                    </m:r>
-                    <m:d>
-                      <m:dPr>
-                        <m:ctrlPr>
-                          <a:rPr lang="en-US" altLang="ko-KR" i="1">
-                            <a:solidFill>
-                              <a:schemeClr val="tx1"/>
-                            </a:solidFill>
-                            <a:latin typeface="Cambria Math" panose="02040503050406030204" pitchFamily="18" charset="0"/>
-                            <a:ea typeface="Seravek Light" charset="0"/>
-                            <a:cs typeface="Seravek Light" charset="0"/>
-                          </a:rPr>
-                        </m:ctrlPr>
-                      </m:dPr>
-                      <m:e>
-                        <m:r>
-                          <a:rPr lang="en-US" altLang="ko-KR" b="1">
-                            <a:solidFill>
-                              <a:schemeClr val="tx1"/>
-                            </a:solidFill>
-                            <a:latin typeface="Cambria Math" charset="0"/>
-                            <a:ea typeface="Seravek Light" charset="0"/>
-                            <a:cs typeface="Seravek Light" charset="0"/>
-                          </a:rPr>
-                          <m:t>𝐀</m:t>
-                        </m:r>
-                      </m:e>
-                    </m:d>
-                    <m:r>
-                      <a:rPr lang="en-US" altLang="ko-KR" i="1">
-                        <a:solidFill>
-                          <a:schemeClr val="tx1"/>
-                        </a:solidFill>
-                        <a:latin typeface="Cambria Math" charset="0"/>
-                        <a:ea typeface="Seravek Light" charset="0"/>
-                        <a:cs typeface="Seravek Light" charset="0"/>
-                      </a:rPr>
-                      <m:t> </m:t>
-                    </m:r>
-                    <m:r>
-                      <a:rPr lang="en-US" altLang="ko-KR" i="1">
-                        <a:solidFill>
-                          <a:schemeClr val="tx1"/>
-                        </a:solidFill>
-                        <a:latin typeface="Cambria Math" charset="0"/>
-                        <a:ea typeface="Cambria Math" charset="0"/>
-                        <a:cs typeface="Cambria Math" charset="0"/>
-                      </a:rPr>
-                      <m:t>× </m:t>
-                    </m:r>
-                    <m:r>
-                      <a:rPr lang="en-US" altLang="ko-KR" b="0" i="1">
-                        <a:solidFill>
-                          <a:schemeClr val="tx1"/>
-                        </a:solidFill>
-                        <a:latin typeface="Cambria Math" charset="0"/>
-                        <a:ea typeface="Cambria Math" charset="0"/>
-                        <a:cs typeface="Cambria Math" charset="0"/>
-                      </a:rPr>
-                      <m:t>𝑃</m:t>
-                    </m:r>
-                    <m:d>
-                      <m:dPr>
-                        <m:ctrlPr>
-                          <a:rPr lang="en-US" altLang="ko-KR" i="1">
-                            <a:solidFill>
-                              <a:schemeClr val="tx1"/>
-                            </a:solidFill>
-                            <a:latin typeface="Cambria Math" panose="02040503050406030204" pitchFamily="18" charset="0"/>
-                            <a:ea typeface="Cambria Math" charset="0"/>
-                            <a:cs typeface="Cambria Math" charset="0"/>
-                          </a:rPr>
-                        </m:ctrlPr>
-                      </m:dPr>
-                      <m:e>
-                        <m:r>
-                          <a:rPr lang="en-US" altLang="ko-KR" b="1">
-                            <a:solidFill>
-                              <a:schemeClr val="tx1"/>
-                            </a:solidFill>
-                            <a:latin typeface="Cambria Math" charset="0"/>
-                            <a:ea typeface="Cambria Math" charset="0"/>
-                            <a:cs typeface="Cambria Math" charset="0"/>
-                          </a:rPr>
-                          <m:t>𝐁</m:t>
-                        </m:r>
-                      </m:e>
-                      <m:e>
-                        <m:r>
-                          <a:rPr lang="en-US" altLang="ko-KR" b="1">
-                            <a:solidFill>
-                              <a:schemeClr val="tx1"/>
-                            </a:solidFill>
-                            <a:latin typeface="Cambria Math" charset="0"/>
-                            <a:ea typeface="Cambria Math" charset="0"/>
-                            <a:cs typeface="Cambria Math" charset="0"/>
-                          </a:rPr>
-                          <m:t>𝐀</m:t>
-                        </m:r>
-                      </m:e>
-                    </m:d>
-                    <m:r>
-                      <a:rPr lang="en-US" altLang="ko-KR" i="1">
-                        <a:solidFill>
-                          <a:schemeClr val="tx1"/>
-                        </a:solidFill>
-                        <a:latin typeface="Cambria Math" charset="0"/>
-                        <a:ea typeface="Cambria Math" charset="0"/>
-                        <a:cs typeface="Cambria Math" charset="0"/>
-                      </a:rPr>
-                      <m:t>=</m:t>
-                    </m:r>
-                    <m:r>
-                      <a:rPr lang="en-US" altLang="ko-KR" b="0" i="1">
-                        <a:solidFill>
-                          <a:schemeClr val="tx1"/>
-                        </a:solidFill>
-                        <a:latin typeface="Cambria Math" charset="0"/>
-                        <a:ea typeface="Seravek Light" charset="0"/>
-                        <a:cs typeface="Seravek Light" charset="0"/>
-                      </a:rPr>
-                      <m:t>𝑃</m:t>
-                    </m:r>
-                    <m:d>
-                      <m:dPr>
-                        <m:ctrlPr>
-                          <a:rPr lang="en-US" altLang="ko-KR" i="1">
-                            <a:solidFill>
-                              <a:schemeClr val="tx1"/>
-                            </a:solidFill>
-                            <a:latin typeface="Cambria Math" panose="02040503050406030204" pitchFamily="18" charset="0"/>
-                            <a:ea typeface="Seravek Light" charset="0"/>
-                            <a:cs typeface="Seravek Light" charset="0"/>
-                          </a:rPr>
-                        </m:ctrlPr>
-                      </m:dPr>
-                      <m:e>
-                        <m:r>
-                          <a:rPr lang="en-US" altLang="ko-KR" b="1">
-                            <a:solidFill>
-                              <a:schemeClr val="tx1"/>
-                            </a:solidFill>
-                            <a:latin typeface="Cambria Math" charset="0"/>
-                            <a:ea typeface="Seravek Light" charset="0"/>
-                            <a:cs typeface="Seravek Light" charset="0"/>
-                          </a:rPr>
-                          <m:t>𝐀</m:t>
-                        </m:r>
-                      </m:e>
-                    </m:d>
-                    <m:r>
-                      <a:rPr lang="en-US" altLang="ko-KR" i="1">
-                        <a:solidFill>
-                          <a:schemeClr val="tx1"/>
-                        </a:solidFill>
-                        <a:latin typeface="Cambria Math" charset="0"/>
-                        <a:ea typeface="Seravek Light" charset="0"/>
-                        <a:cs typeface="Seravek Light" charset="0"/>
-                      </a:rPr>
-                      <m:t> </m:t>
-                    </m:r>
-                    <m:r>
-                      <a:rPr lang="en-US" altLang="ko-KR" i="1">
-                        <a:solidFill>
-                          <a:schemeClr val="tx1"/>
-                        </a:solidFill>
-                        <a:latin typeface="Cambria Math" charset="0"/>
-                        <a:ea typeface="Cambria Math" charset="0"/>
-                        <a:cs typeface="Cambria Math" charset="0"/>
-                      </a:rPr>
-                      <m:t>× </m:t>
-                    </m:r>
-                    <m:r>
-                      <a:rPr lang="en-US" altLang="ko-KR" b="0" i="1">
-                        <a:solidFill>
-                          <a:schemeClr val="tx1"/>
-                        </a:solidFill>
-                        <a:latin typeface="Cambria Math" charset="0"/>
-                        <a:ea typeface="Cambria Math" charset="0"/>
-                        <a:cs typeface="Cambria Math" charset="0"/>
-                      </a:rPr>
-                      <m:t>𝑃</m:t>
-                    </m:r>
-                    <m:r>
-                      <a:rPr lang="en-US" altLang="ko-KR" b="1" i="1" smtClean="0">
-                        <a:solidFill>
-                          <a:schemeClr val="tx1"/>
-                        </a:solidFill>
-                        <a:latin typeface="Cambria Math" charset="0"/>
-                        <a:ea typeface="Cambria Math" charset="0"/>
-                        <a:cs typeface="Cambria Math" charset="0"/>
-                      </a:rPr>
-                      <m:t>(</m:t>
-                    </m:r>
-                    <m:r>
-                      <a:rPr lang="en-US" altLang="ko-KR" b="1" i="0" smtClean="0">
-                        <a:solidFill>
-                          <a:schemeClr val="tx1"/>
-                        </a:solidFill>
-                        <a:latin typeface="Cambria Math" charset="0"/>
-                        <a:ea typeface="Cambria Math" charset="0"/>
-                        <a:cs typeface="Cambria Math" charset="0"/>
-                      </a:rPr>
-                      <m:t>𝐁</m:t>
-                    </m:r>
-                    <m:r>
-                      <a:rPr lang="en-US" altLang="ko-KR" b="1" i="1" smtClean="0">
-                        <a:solidFill>
-                          <a:schemeClr val="tx1"/>
-                        </a:solidFill>
-                        <a:latin typeface="Cambria Math" charset="0"/>
-                        <a:ea typeface="Cambria Math" charset="0"/>
-                        <a:cs typeface="Cambria Math" charset="0"/>
-                      </a:rPr>
-                      <m:t>)</m:t>
-                    </m:r>
-                  </m:oMath>
-                </a14:m>
-                <a:endParaRPr lang="en-US" altLang="ko-KR" dirty="0">
-                  <a:solidFill>
-                    <a:schemeClr val="tx1"/>
-                  </a:solidFill>
-                  <a:latin typeface="Seravek Light" charset="0"/>
-                  <a:ea typeface="Seravek Light" charset="0"/>
-                  <a:cs typeface="Seravek Light" charset="0"/>
-                </a:endParaRPr>
-              </a:p>
-              <a:p>
-                <a:pPr marL="314325" indent="-314325">
-                  <a:lnSpc>
-                    <a:spcPct val="150000"/>
-                  </a:lnSpc>
-                  <a:buFont typeface="Arial" charset="0"/>
-                  <a:buChar char="•"/>
-                </a:pPr>
-                <a:endParaRPr lang="en-US" altLang="ko-KR" b="0" dirty="0">
-                  <a:latin typeface="Seravek Light" charset="0"/>
-                  <a:ea typeface="Seravek Light" charset="0"/>
-                  <a:cs typeface="Seravek Light" charset="0"/>
-                </a:endParaRPr>
-              </a:p>
-              <a:p>
-                <a:pPr marL="314325" indent="-314325">
-                  <a:lnSpc>
-                    <a:spcPct val="150000"/>
-                  </a:lnSpc>
-                  <a:buFont typeface="Arial" charset="0"/>
-                  <a:buChar char="•"/>
-                </a:pPr>
-                <a:r>
-                  <a:rPr lang="en-US" altLang="ko-KR" dirty="0">
-                    <a:latin typeface="Seravek Light" charset="0"/>
-                    <a:ea typeface="Seravek Light" charset="0"/>
-                    <a:cs typeface="Seravek Light" charset="0"/>
-                  </a:rPr>
-                  <a:t>Independence </a:t>
-                </a:r>
-                <a14:m>
-                  <m:oMath xmlns:m="http://schemas.openxmlformats.org/officeDocument/2006/math">
-                    <m:r>
-                      <a:rPr lang="en-US" altLang="ko-KR" i="1" smtClean="0">
-                        <a:latin typeface="Cambria Math" charset="0"/>
-                        <a:ea typeface="Cambria Math" charset="0"/>
-                        <a:cs typeface="Cambria Math" charset="0"/>
-                      </a:rPr>
-                      <m:t>≠</m:t>
-                    </m:r>
-                  </m:oMath>
-                </a14:m>
-                <a:r>
-                  <a:rPr lang="en-US" altLang="ko-KR" b="0" dirty="0">
-                    <a:latin typeface="Seravek Light" charset="0"/>
-                    <a:ea typeface="Seravek Light" charset="0"/>
-                    <a:cs typeface="Seravek Light" charset="0"/>
-                  </a:rPr>
-                  <a:t> Disjoint </a:t>
-                </a:r>
-              </a:p>
-              <a:p>
-                <a:pPr marL="771525" lvl="1" indent="-314325">
-                  <a:lnSpc>
-                    <a:spcPct val="150000"/>
-                  </a:lnSpc>
-                  <a:buFont typeface="Arial" charset="0"/>
-                  <a:buChar char="•"/>
-                </a:pPr>
-                <a:r>
-                  <a:rPr lang="en-US" altLang="ko-KR" b="1" dirty="0">
-                    <a:latin typeface="Seravek Light" charset="0"/>
-                    <a:ea typeface="Seravek Light" charset="0"/>
-                    <a:cs typeface="Seravek Light" charset="0"/>
-                  </a:rPr>
-                  <a:t>Disjoint:</a:t>
-                </a:r>
-                <a:r>
-                  <a:rPr lang="en-US" altLang="ko-KR" dirty="0">
-                    <a:latin typeface="Seravek Light" charset="0"/>
-                    <a:ea typeface="Seravek Light" charset="0"/>
-                    <a:cs typeface="Seravek Light" charset="0"/>
-                  </a:rPr>
-                  <a:t> </a:t>
-                </a:r>
-                <a:r>
-                  <a:rPr lang="en-US" altLang="ko-KR" b="1" i="1" dirty="0">
-                    <a:latin typeface="Seravek Light" charset="0"/>
-                    <a:ea typeface="Seravek Light" charset="0"/>
-                    <a:cs typeface="Seravek Light" charset="0"/>
-                  </a:rPr>
-                  <a:t>P</a:t>
-                </a:r>
-                <a:r>
-                  <a:rPr lang="en-US" altLang="ko-KR" dirty="0">
-                    <a:latin typeface="Seravek Light" charset="0"/>
-                    <a:ea typeface="Seravek Light" charset="0"/>
-                    <a:cs typeface="Seravek Light" charset="0"/>
-                  </a:rPr>
-                  <a:t>(</a:t>
-                </a:r>
-                <a:r>
-                  <a:rPr lang="en-US" altLang="ko-KR" b="1" dirty="0">
-                    <a:latin typeface="Seravek Light" charset="0"/>
-                    <a:ea typeface="Seravek Light" charset="0"/>
-                    <a:cs typeface="Seravek Light" charset="0"/>
-                  </a:rPr>
-                  <a:t>A</a:t>
-                </a:r>
-                <a:r>
-                  <a:rPr lang="en-US" altLang="ko-KR" dirty="0">
-                    <a:latin typeface="Seravek Light" charset="0"/>
-                    <a:ea typeface="Seravek Light" charset="0"/>
-                    <a:cs typeface="Seravek Light" charset="0"/>
-                  </a:rPr>
-                  <a:t> </a:t>
-                </a:r>
-                <a:r>
-                  <a:rPr lang="en-US" altLang="ko-KR" i="1" dirty="0">
-                    <a:latin typeface="Seravek Light" charset="0"/>
-                    <a:ea typeface="Seravek Light" charset="0"/>
-                    <a:cs typeface="Seravek Light" charset="0"/>
-                  </a:rPr>
-                  <a:t>and </a:t>
-                </a:r>
-                <a:r>
-                  <a:rPr lang="en-US" altLang="ko-KR" b="1" dirty="0">
-                    <a:latin typeface="Seravek Light" charset="0"/>
-                    <a:ea typeface="Seravek Light" charset="0"/>
-                    <a:cs typeface="Seravek Light" charset="0"/>
-                  </a:rPr>
-                  <a:t>B</a:t>
-                </a:r>
-                <a:r>
-                  <a:rPr lang="en-US" altLang="ko-KR" dirty="0">
-                    <a:latin typeface="Seravek Light" charset="0"/>
-                    <a:ea typeface="Seravek Light" charset="0"/>
-                    <a:cs typeface="Seravek Light" charset="0"/>
-                  </a:rPr>
-                  <a:t>) = 0: the events cannot happen simultaneously</a:t>
-                </a:r>
-              </a:p>
-              <a:p>
-                <a:pPr marL="771525" lvl="1" indent="-314325">
-                  <a:lnSpc>
-                    <a:spcPct val="150000"/>
-                  </a:lnSpc>
-                  <a:buFont typeface="Arial" charset="0"/>
-                  <a:buChar char="•"/>
-                </a:pPr>
-                <a:r>
-                  <a:rPr lang="en-US" altLang="ko-KR" b="1" dirty="0">
-                    <a:latin typeface="Seravek Light" charset="0"/>
-                    <a:ea typeface="Seravek Light" charset="0"/>
-                    <a:cs typeface="Seravek Light" charset="0"/>
-                  </a:rPr>
-                  <a:t>Independence:</a:t>
-                </a:r>
-                <a:r>
-                  <a:rPr lang="en-US" altLang="ko-KR" dirty="0">
-                    <a:latin typeface="Seravek Light" charset="0"/>
-                    <a:ea typeface="Seravek Light" charset="0"/>
-                    <a:cs typeface="Seravek Light" charset="0"/>
-                  </a:rPr>
-                  <a:t> the occurrence of A does not change the probability of B, </a:t>
-                </a:r>
-                <a14:m>
-                  <m:oMath xmlns:m="http://schemas.openxmlformats.org/officeDocument/2006/math">
-                    <m:r>
-                      <a:rPr lang="en-US" altLang="ko-KR" b="0" i="1">
-                        <a:latin typeface="Cambria Math" charset="0"/>
-                        <a:ea typeface="Seravek Light" charset="0"/>
-                        <a:cs typeface="Seravek Light" charset="0"/>
-                      </a:rPr>
-                      <m:t>𝑃</m:t>
-                    </m:r>
-                    <m:d>
-                      <m:dPr>
-                        <m:ctrlPr>
-                          <a:rPr lang="en-US" altLang="ko-KR" i="1">
-                            <a:latin typeface="Cambria Math" panose="02040503050406030204" pitchFamily="18" charset="0"/>
-                            <a:ea typeface="Seravek Light" charset="0"/>
-                            <a:cs typeface="Seravek Light" charset="0"/>
-                          </a:rPr>
-                        </m:ctrlPr>
-                      </m:dPr>
-                      <m:e>
-                        <m:r>
-                          <a:rPr lang="en-US" altLang="ko-KR" b="1">
-                            <a:latin typeface="Cambria Math" charset="0"/>
-                            <a:ea typeface="Seravek Light" charset="0"/>
-                            <a:cs typeface="Seravek Light" charset="0"/>
-                          </a:rPr>
-                          <m:t>𝐁</m:t>
-                        </m:r>
-                      </m:e>
-                      <m:e>
-                        <m:r>
-                          <a:rPr lang="en-US" altLang="ko-KR" b="1">
-                            <a:latin typeface="Cambria Math" charset="0"/>
-                            <a:ea typeface="Seravek Light" charset="0"/>
-                            <a:cs typeface="Seravek Light" charset="0"/>
-                          </a:rPr>
-                          <m:t>𝐀</m:t>
-                        </m:r>
-                      </m:e>
-                    </m:d>
-                    <m:r>
-                      <a:rPr lang="en-US" altLang="ko-KR" i="1">
-                        <a:latin typeface="Cambria Math" charset="0"/>
-                        <a:ea typeface="Seravek Light" charset="0"/>
-                        <a:cs typeface="Seravek Light" charset="0"/>
-                      </a:rPr>
-                      <m:t>=</m:t>
-                    </m:r>
-                    <m:r>
-                      <a:rPr lang="en-US" altLang="ko-KR" b="0" i="1">
-                        <a:latin typeface="Cambria Math" charset="0"/>
-                        <a:ea typeface="Seravek Light" charset="0"/>
-                        <a:cs typeface="Seravek Light" charset="0"/>
-                      </a:rPr>
-                      <m:t>𝑃</m:t>
-                    </m:r>
-                    <m:d>
-                      <m:dPr>
-                        <m:ctrlPr>
-                          <a:rPr lang="en-US" altLang="ko-KR" i="1">
-                            <a:latin typeface="Cambria Math" panose="02040503050406030204" pitchFamily="18" charset="0"/>
-                            <a:ea typeface="Seravek Light" charset="0"/>
-                            <a:cs typeface="Seravek Light" charset="0"/>
-                          </a:rPr>
-                        </m:ctrlPr>
-                      </m:dPr>
-                      <m:e>
-                        <m:r>
-                          <a:rPr lang="en-US" altLang="ko-KR" b="1">
-                            <a:latin typeface="Cambria Math" charset="0"/>
-                            <a:ea typeface="Seravek Light" charset="0"/>
-                            <a:cs typeface="Seravek Light" charset="0"/>
-                          </a:rPr>
-                          <m:t>𝐁</m:t>
-                        </m:r>
-                      </m:e>
-                    </m:d>
-                  </m:oMath>
-                </a14:m>
-                <a:endParaRPr lang="en-US" altLang="ko-KR" dirty="0">
-                  <a:latin typeface="Seravek Light" charset="0"/>
-                  <a:ea typeface="Seravek Light" charset="0"/>
-                  <a:cs typeface="Seravek Light" charset="0"/>
-                </a:endParaRPr>
-              </a:p>
-            </p:txBody>
-          </p:sp>
-        </mc:Choice>
-        <mc:Fallback xmlns="">
-          <p:sp>
-            <p:nvSpPr>
-              <p:cNvPr id="14" name="텍스트 상자 13"/>
-              <p:cNvSpPr txBox="1">
-                <a:spLocks noRot="1" noChangeAspect="1" noMove="1" noResize="1" noEditPoints="1" noAdjustHandles="1" noChangeArrowheads="1" noChangeShapeType="1" noTextEdit="1"/>
-              </p:cNvSpPr>
-              <p:nvPr/>
-            </p:nvSpPr>
-            <p:spPr>
-              <a:xfrm>
-                <a:off x="1136287" y="989045"/>
-                <a:ext cx="10657608" cy="3831818"/>
-              </a:xfrm>
-              <a:prstGeom prst="rect">
-                <a:avLst/>
-              </a:prstGeom>
-              <a:blipFill rotWithShape="0">
-                <a:blip r:embed="rId7"/>
-                <a:stretch>
-                  <a:fillRect l="-343" b="-636"/>
-                </a:stretch>
-              </a:blipFill>
-            </p:spPr>
-            <p:txBody>
-              <a:bodyPr/>
-              <a:lstStyle/>
-              <a:p>
-                <a:r>
-                  <a:rPr lang="ko-KR" altLang="en-US">
-                    <a:noFill/>
-                  </a:rPr>
-                  <a:t> </a:t>
-                </a:r>
-              </a:p>
-            </p:txBody>
-          </p:sp>
-        </mc:Fallback>
-      </mc:AlternateContent>
-      <p:sp>
-        <p:nvSpPr>
-          <p:cNvPr id="12" name="직사각형 11"/>
-          <p:cNvSpPr/>
-          <p:nvPr/>
-        </p:nvSpPr>
-        <p:spPr>
-          <a:xfrm>
-            <a:off x="9894433" y="84109"/>
-            <a:ext cx="2301508" cy="276999"/>
-          </a:xfrm>
-          <a:prstGeom prst="rect">
-            <a:avLst/>
-          </a:prstGeom>
-        </p:spPr>
-        <p:txBody>
-          <a:bodyPr wrap="square">
-            <a:spAutoFit/>
-          </a:bodyPr>
-          <a:lstStyle/>
-          <a:p>
-            <a:pPr algn="r"/>
-            <a:r>
-              <a:rPr lang="en-US" altLang="ko-KR" sz="1200" dirty="0">
-                <a:latin typeface="Seravek Light" charset="0"/>
-                <a:ea typeface="Seravek Light" charset="0"/>
-                <a:cs typeface="Seravek Light" charset="0"/>
-              </a:rPr>
-              <a:t>Lecture 10</a:t>
-            </a:r>
-            <a:endParaRPr lang="ko-KR" altLang="en-US" sz="1200" dirty="0">
-              <a:latin typeface="Seravek Light" charset="0"/>
-              <a:ea typeface="Seravek Light" charset="0"/>
-              <a:cs typeface="Seravek Light" charset="0"/>
-            </a:endParaRPr>
-          </a:p>
-        </p:txBody>
-      </p:sp>
-    </p:spTree>
-    <p:extLst>
-      <p:ext uri="{BB962C8B-B14F-4D97-AF65-F5344CB8AC3E}">
-        <p14:creationId xmlns:p14="http://schemas.microsoft.com/office/powerpoint/2010/main" val="3680418358"/>
-      </p:ext>
-    </p:extLst>
-  </p:cSld>
-  <p:clrMapOvr>
-    <a:masterClrMapping/>
-  </p:clrMapOvr>
-  <p:timing>
-    <p:tnLst>
-      <p:par>
-        <p:cTn id="1" dur="indefinite" restart="never" nodeType="tmRoot">
-          <p:childTnLst>
-            <p:seq concurrent="1" nextAc="seek">
-              <p:cTn id="2" dur="indefinite" nodeType="mainSeq">
-                <p:childTnLst>
-                  <p:par>
-                    <p:cTn id="3" fill="hold">
-                      <p:stCondLst>
-                        <p:cond delay="indefinite"/>
-                      </p:stCondLst>
-                      <p:childTnLst>
-                        <p:par>
-                          <p:cTn id="4" fill="hold">
-                            <p:stCondLst>
-                              <p:cond delay="0"/>
-                            </p:stCondLst>
-                            <p:childTnLst>
-                              <p:par>
-                                <p:cTn id="5" presetID="1" presetClass="entr" presetSubtype="0" fill="hold" grpId="0" nodeType="clickEffect">
-                                  <p:stCondLst>
-                                    <p:cond delay="0"/>
-                                  </p:stCondLst>
-                                  <p:childTnLst>
-                                    <p:set>
-                                      <p:cBhvr>
-                                        <p:cTn id="6" dur="1" fill="hold">
-                                          <p:stCondLst>
-                                            <p:cond delay="0"/>
-                                          </p:stCondLst>
-                                        </p:cTn>
-                                        <p:tgtEl>
-                                          <p:spTgt spid="14">
-                                            <p:txEl>
-                                              <p:pRg st="0" end="0"/>
-                                            </p:txEl>
-                                          </p:spTgt>
-                                        </p:tgtEl>
-                                        <p:attrNameLst>
-                                          <p:attrName>style.visibility</p:attrName>
-                                        </p:attrNameLst>
-                                      </p:cBhvr>
-                                      <p:to>
-                                        <p:strVal val="visible"/>
-                                      </p:to>
-                                    </p:set>
-                                  </p:childTnLst>
-                                </p:cTn>
-                              </p:par>
-                              <p:par>
-                                <p:cTn id="7" presetID="1" presetClass="entr" presetSubtype="0" fill="hold" grpId="0" nodeType="withEffect">
-                                  <p:stCondLst>
-                                    <p:cond delay="0"/>
-                                  </p:stCondLst>
-                                  <p:childTnLst>
-                                    <p:set>
-                                      <p:cBhvr>
-                                        <p:cTn id="8" dur="1" fill="hold">
-                                          <p:stCondLst>
-                                            <p:cond delay="0"/>
-                                          </p:stCondLst>
-                                        </p:cTn>
-                                        <p:tgtEl>
-                                          <p:spTgt spid="14">
-                                            <p:txEl>
-                                              <p:pRg st="1" end="1"/>
-                                            </p:txEl>
-                                          </p:spTgt>
-                                        </p:tgtEl>
-                                        <p:attrNameLst>
-                                          <p:attrName>style.visibility</p:attrName>
-                                        </p:attrNameLst>
-                                      </p:cBhvr>
-                                      <p:to>
-                                        <p:strVal val="visible"/>
-                                      </p:to>
-                                    </p:set>
-                                  </p:childTnLst>
-                                </p:cTn>
-                              </p:par>
-                            </p:childTnLst>
-                          </p:cTn>
-                        </p:par>
-                      </p:childTnLst>
-                    </p:cTn>
-                  </p:par>
-                  <p:par>
-                    <p:cTn id="9" fill="hold">
-                      <p:stCondLst>
-                        <p:cond delay="indefinite"/>
-                      </p:stCondLst>
-                      <p:childTnLst>
-                        <p:par>
-                          <p:cTn id="10" fill="hold">
-                            <p:stCondLst>
-                              <p:cond delay="0"/>
-                            </p:stCondLst>
-                            <p:childTnLst>
-                              <p:par>
-                                <p:cTn id="11" presetID="1" presetClass="entr" presetSubtype="0" fill="hold" grpId="0" nodeType="clickEffect">
-                                  <p:stCondLst>
-                                    <p:cond delay="0"/>
-                                  </p:stCondLst>
-                                  <p:childTnLst>
-                                    <p:set>
-                                      <p:cBhvr>
-                                        <p:cTn id="12" dur="1" fill="hold">
-                                          <p:stCondLst>
-                                            <p:cond delay="0"/>
-                                          </p:stCondLst>
-                                        </p:cTn>
-                                        <p:tgtEl>
-                                          <p:spTgt spid="14">
-                                            <p:txEl>
-                                              <p:pRg st="3" end="3"/>
-                                            </p:txEl>
-                                          </p:spTgt>
-                                        </p:tgtEl>
-                                        <p:attrNameLst>
-                                          <p:attrName>style.visibility</p:attrName>
-                                        </p:attrNameLst>
-                                      </p:cBhvr>
-                                      <p:to>
-                                        <p:strVal val="visible"/>
-                                      </p:to>
-                                    </p:set>
-                                  </p:childTnLst>
-                                </p:cTn>
-                              </p:par>
-                              <p:par>
-                                <p:cTn id="13" presetID="1" presetClass="entr" presetSubtype="0" fill="hold" grpId="0" nodeType="withEffect">
-                                  <p:stCondLst>
-                                    <p:cond delay="0"/>
-                                  </p:stCondLst>
-                                  <p:childTnLst>
-                                    <p:set>
-                                      <p:cBhvr>
-                                        <p:cTn id="14" dur="1" fill="hold">
-                                          <p:stCondLst>
-                                            <p:cond delay="0"/>
-                                          </p:stCondLst>
-                                        </p:cTn>
-                                        <p:tgtEl>
-                                          <p:spTgt spid="14">
-                                            <p:txEl>
-                                              <p:pRg st="4" end="4"/>
-                                            </p:txEl>
-                                          </p:spTgt>
-                                        </p:tgtEl>
-                                        <p:attrNameLst>
-                                          <p:attrName>style.visibility</p:attrName>
-                                        </p:attrNameLst>
-                                      </p:cBhvr>
-                                      <p:to>
-                                        <p:strVal val="visible"/>
-                                      </p:to>
-                                    </p:set>
-                                  </p:childTnLst>
-                                </p:cTn>
-                              </p:par>
-                            </p:childTnLst>
-                          </p:cTn>
-                        </p:par>
-                      </p:childTnLst>
-                    </p:cTn>
-                  </p:par>
-                  <p:par>
-                    <p:cTn id="15" fill="hold">
-                      <p:stCondLst>
-                        <p:cond delay="indefinite"/>
-                      </p:stCondLst>
-                      <p:childTnLst>
-                        <p:par>
-                          <p:cTn id="16" fill="hold">
-                            <p:stCondLst>
-                              <p:cond delay="0"/>
-                            </p:stCondLst>
-                            <p:childTnLst>
-                              <p:par>
-                                <p:cTn id="17" presetID="1" presetClass="entr" presetSubtype="0" fill="hold" grpId="0" nodeType="clickEffect">
-                                  <p:stCondLst>
-                                    <p:cond delay="0"/>
-                                  </p:stCondLst>
-                                  <p:childTnLst>
-                                    <p:set>
-                                      <p:cBhvr>
-                                        <p:cTn id="18" dur="1" fill="hold">
-                                          <p:stCondLst>
-                                            <p:cond delay="0"/>
-                                          </p:stCondLst>
-                                        </p:cTn>
-                                        <p:tgtEl>
-                                          <p:spTgt spid="14">
-                                            <p:txEl>
-                                              <p:pRg st="6" end="6"/>
-                                            </p:txEl>
-                                          </p:spTgt>
-                                        </p:tgtEl>
-                                        <p:attrNameLst>
-                                          <p:attrName>style.visibility</p:attrName>
-                                        </p:attrNameLst>
-                                      </p:cBhvr>
-                                      <p:to>
-                                        <p:strVal val="visible"/>
-                                      </p:to>
-                                    </p:set>
-                                  </p:childTnLst>
-                                </p:cTn>
-                              </p:par>
-                            </p:childTnLst>
-                          </p:cTn>
-                        </p:par>
-                      </p:childTnLst>
-                    </p:cTn>
-                  </p:par>
-                  <p:par>
-                    <p:cTn id="19" fill="hold">
-                      <p:stCondLst>
-                        <p:cond delay="indefinite"/>
-                      </p:stCondLst>
-                      <p:childTnLst>
-                        <p:par>
-                          <p:cTn id="20" fill="hold">
-                            <p:stCondLst>
-                              <p:cond delay="0"/>
-                            </p:stCondLst>
-                            <p:childTnLst>
-                              <p:par>
-                                <p:cTn id="21" presetID="1" presetClass="entr" presetSubtype="0" fill="hold" grpId="0" nodeType="clickEffect">
-                                  <p:stCondLst>
-                                    <p:cond delay="0"/>
-                                  </p:stCondLst>
-                                  <p:childTnLst>
-                                    <p:set>
-                                      <p:cBhvr>
-                                        <p:cTn id="22" dur="1" fill="hold">
-                                          <p:stCondLst>
-                                            <p:cond delay="0"/>
-                                          </p:stCondLst>
-                                        </p:cTn>
-                                        <p:tgtEl>
-                                          <p:spTgt spid="14">
-                                            <p:txEl>
-                                              <p:pRg st="7" end="7"/>
-                                            </p:txEl>
-                                          </p:spTgt>
-                                        </p:tgtEl>
-                                        <p:attrNameLst>
-                                          <p:attrName>style.visibility</p:attrName>
-                                        </p:attrNameLst>
-                                      </p:cBhvr>
-                                      <p:to>
-                                        <p:strVal val="visible"/>
-                                      </p:to>
-                                    </p:set>
-                                  </p:childTnLst>
-                                </p:cTn>
-                              </p:par>
-                            </p:childTnLst>
-                          </p:cTn>
-                        </p:par>
-                      </p:childTnLst>
-                    </p:cTn>
-                  </p:par>
-                  <p:par>
-                    <p:cTn id="23" fill="hold">
-                      <p:stCondLst>
-                        <p:cond delay="indefinite"/>
-                      </p:stCondLst>
-                      <p:childTnLst>
-                        <p:par>
-                          <p:cTn id="24" fill="hold">
-                            <p:stCondLst>
-                              <p:cond delay="0"/>
-                            </p:stCondLst>
-                            <p:childTnLst>
-                              <p:par>
-                                <p:cTn id="25" presetID="1" presetClass="entr" presetSubtype="0" fill="hold" grpId="0" nodeType="clickEffect">
-                                  <p:stCondLst>
-                                    <p:cond delay="0"/>
-                                  </p:stCondLst>
-                                  <p:childTnLst>
-                                    <p:set>
-                                      <p:cBhvr>
-                                        <p:cTn id="26" dur="1" fill="hold">
-                                          <p:stCondLst>
-                                            <p:cond delay="0"/>
-                                          </p:stCondLst>
-                                        </p:cTn>
-                                        <p:tgtEl>
-                                          <p:spTgt spid="14">
-                                            <p:txEl>
-                                              <p:pRg st="8" end="8"/>
-                                            </p:txEl>
-                                          </p:spTgt>
                                         </p:tgtEl>
                                         <p:attrNameLst>
                                           <p:attrName>style.visibility</p:attrName>

</xml_diff>